<commit_message>
add decorator pattern examples
</commit_message>
<xml_diff>
--- a/Tasarımdesenleri.pptx
+++ b/Tasarımdesenleri.pptx
@@ -10,21 +10,27 @@
     <p:sldId id="259" r:id="rId4"/>
     <p:sldId id="260" r:id="rId5"/>
     <p:sldId id="262" r:id="rId6"/>
-    <p:sldId id="266" r:id="rId7"/>
+    <p:sldId id="278" r:id="rId7"/>
     <p:sldId id="261" r:id="rId8"/>
     <p:sldId id="268" r:id="rId9"/>
     <p:sldId id="263" r:id="rId10"/>
     <p:sldId id="264" r:id="rId11"/>
     <p:sldId id="265" r:id="rId12"/>
-    <p:sldId id="277" r:id="rId13"/>
-    <p:sldId id="269" r:id="rId14"/>
-    <p:sldId id="273" r:id="rId15"/>
-    <p:sldId id="270" r:id="rId16"/>
-    <p:sldId id="272" r:id="rId17"/>
-    <p:sldId id="276" r:id="rId18"/>
-    <p:sldId id="274" r:id="rId19"/>
-    <p:sldId id="275" r:id="rId20"/>
-    <p:sldId id="258" r:id="rId21"/>
+    <p:sldId id="279" r:id="rId13"/>
+    <p:sldId id="273" r:id="rId14"/>
+    <p:sldId id="270" r:id="rId15"/>
+    <p:sldId id="272" r:id="rId16"/>
+    <p:sldId id="276" r:id="rId17"/>
+    <p:sldId id="274" r:id="rId18"/>
+    <p:sldId id="275" r:id="rId19"/>
+    <p:sldId id="280" r:id="rId20"/>
+    <p:sldId id="282" r:id="rId21"/>
+    <p:sldId id="281" r:id="rId22"/>
+    <p:sldId id="284" r:id="rId23"/>
+    <p:sldId id="283" r:id="rId24"/>
+    <p:sldId id="285" r:id="rId25"/>
+    <p:sldId id="286" r:id="rId26"/>
+    <p:sldId id="258" r:id="rId27"/>
   </p:sldIdLst>
   <p:sldSz cx="12192000" cy="6858000"/>
   <p:notesSz cx="6858000" cy="9144000"/>
@@ -280,7 +286,7 @@
           <a:p>
             <a:fld id="{8EB7B78A-CD2F-054B-9591-8F4C28D48A16}" type="datetimeFigureOut">
               <a:rPr lang="en-TR" smtClean="0"/>
-              <a:t>9.02.2024</a:t>
+              <a:t>11.02.2024</a:t>
             </a:fld>
             <a:endParaRPr lang="en-TR"/>
           </a:p>
@@ -480,7 +486,7 @@
           <a:p>
             <a:fld id="{8EB7B78A-CD2F-054B-9591-8F4C28D48A16}" type="datetimeFigureOut">
               <a:rPr lang="en-TR" smtClean="0"/>
-              <a:t>9.02.2024</a:t>
+              <a:t>11.02.2024</a:t>
             </a:fld>
             <a:endParaRPr lang="en-TR"/>
           </a:p>
@@ -690,7 +696,7 @@
           <a:p>
             <a:fld id="{8EB7B78A-CD2F-054B-9591-8F4C28D48A16}" type="datetimeFigureOut">
               <a:rPr lang="en-TR" smtClean="0"/>
-              <a:t>9.02.2024</a:t>
+              <a:t>11.02.2024</a:t>
             </a:fld>
             <a:endParaRPr lang="en-TR"/>
           </a:p>
@@ -890,7 +896,7 @@
           <a:p>
             <a:fld id="{8EB7B78A-CD2F-054B-9591-8F4C28D48A16}" type="datetimeFigureOut">
               <a:rPr lang="en-TR" smtClean="0"/>
-              <a:t>9.02.2024</a:t>
+              <a:t>11.02.2024</a:t>
             </a:fld>
             <a:endParaRPr lang="en-TR"/>
           </a:p>
@@ -1166,7 +1172,7 @@
           <a:p>
             <a:fld id="{8EB7B78A-CD2F-054B-9591-8F4C28D48A16}" type="datetimeFigureOut">
               <a:rPr lang="en-TR" smtClean="0"/>
-              <a:t>9.02.2024</a:t>
+              <a:t>11.02.2024</a:t>
             </a:fld>
             <a:endParaRPr lang="en-TR"/>
           </a:p>
@@ -1434,7 +1440,7 @@
           <a:p>
             <a:fld id="{8EB7B78A-CD2F-054B-9591-8F4C28D48A16}" type="datetimeFigureOut">
               <a:rPr lang="en-TR" smtClean="0"/>
-              <a:t>9.02.2024</a:t>
+              <a:t>11.02.2024</a:t>
             </a:fld>
             <a:endParaRPr lang="en-TR"/>
           </a:p>
@@ -1849,7 +1855,7 @@
           <a:p>
             <a:fld id="{8EB7B78A-CD2F-054B-9591-8F4C28D48A16}" type="datetimeFigureOut">
               <a:rPr lang="en-TR" smtClean="0"/>
-              <a:t>9.02.2024</a:t>
+              <a:t>11.02.2024</a:t>
             </a:fld>
             <a:endParaRPr lang="en-TR"/>
           </a:p>
@@ -1991,7 +1997,7 @@
           <a:p>
             <a:fld id="{8EB7B78A-CD2F-054B-9591-8F4C28D48A16}" type="datetimeFigureOut">
               <a:rPr lang="en-TR" smtClean="0"/>
-              <a:t>9.02.2024</a:t>
+              <a:t>11.02.2024</a:t>
             </a:fld>
             <a:endParaRPr lang="en-TR"/>
           </a:p>
@@ -2104,7 +2110,7 @@
           <a:p>
             <a:fld id="{8EB7B78A-CD2F-054B-9591-8F4C28D48A16}" type="datetimeFigureOut">
               <a:rPr lang="en-TR" smtClean="0"/>
-              <a:t>9.02.2024</a:t>
+              <a:t>11.02.2024</a:t>
             </a:fld>
             <a:endParaRPr lang="en-TR"/>
           </a:p>
@@ -2417,7 +2423,7 @@
           <a:p>
             <a:fld id="{8EB7B78A-CD2F-054B-9591-8F4C28D48A16}" type="datetimeFigureOut">
               <a:rPr lang="en-TR" smtClean="0"/>
-              <a:t>9.02.2024</a:t>
+              <a:t>11.02.2024</a:t>
             </a:fld>
             <a:endParaRPr lang="en-TR"/>
           </a:p>
@@ -2706,7 +2712,7 @@
           <a:p>
             <a:fld id="{8EB7B78A-CD2F-054B-9591-8F4C28D48A16}" type="datetimeFigureOut">
               <a:rPr lang="en-TR" smtClean="0"/>
-              <a:t>9.02.2024</a:t>
+              <a:t>11.02.2024</a:t>
             </a:fld>
             <a:endParaRPr lang="en-TR"/>
           </a:p>
@@ -2949,7 +2955,7 @@
           <a:p>
             <a:fld id="{8EB7B78A-CD2F-054B-9591-8F4C28D48A16}" type="datetimeFigureOut">
               <a:rPr lang="en-TR" smtClean="0"/>
-              <a:t>9.02.2024</a:t>
+              <a:t>11.02.2024</a:t>
             </a:fld>
             <a:endParaRPr lang="en-TR"/>
           </a:p>
@@ -4099,7 +4105,7 @@
         <p:cNvPr id="1" name="">
           <a:extLst>
             <a:ext uri="{FF2B5EF4-FFF2-40B4-BE49-F238E27FC236}">
-              <a16:creationId xmlns:a16="http://schemas.microsoft.com/office/drawing/2014/main" id="{EA304C2E-C85D-94C6-2604-71990400BC64}"/>
+              <a16:creationId xmlns:a16="http://schemas.microsoft.com/office/drawing/2014/main" id="{D6E59942-D0F8-8BE6-B9D6-8DABF6E12DA5}"/>
             </a:ext>
           </a:extLst>
         </p:cNvPr>
@@ -4119,7 +4125,7 @@
           <p:cNvPr id="2" name="Title 1">
             <a:extLst>
               <a:ext uri="{FF2B5EF4-FFF2-40B4-BE49-F238E27FC236}">
-                <a16:creationId xmlns:a16="http://schemas.microsoft.com/office/drawing/2014/main" id="{4B338C2C-37D4-3C93-053D-901BFB07D218}"/>
+                <a16:creationId xmlns:a16="http://schemas.microsoft.com/office/drawing/2014/main" id="{235FEF23-DC2C-0C2C-153F-6BFA41CA19E8}"/>
               </a:ext>
             </a:extLst>
           </p:cNvPr>
@@ -4138,13 +4144,20 @@
         </p:spPr>
         <p:txBody>
           <a:bodyPr>
-            <a:normAutofit/>
+            <a:normAutofit fontScale="90000"/>
           </a:bodyPr>
           <a:lstStyle/>
           <a:p>
             <a:r>
               <a:rPr lang="en-TR" b="1" dirty="0"/>
-              <a:t>Design Pattern</a:t>
+              <a:t>Design Pattern Series</a:t>
+            </a:r>
+            <a:br>
+              <a:rPr lang="en-TR" b="1" dirty="0"/>
+            </a:br>
+            <a:r>
+              <a:rPr lang="en-TR" sz="4200" b="1" dirty="0"/>
+              <a:t>Observer Pattern</a:t>
             </a:r>
             <a:br>
               <a:rPr lang="en-TR" b="1" dirty="0"/>
@@ -4158,7 +4171,7 @@
           <p:cNvPr id="3" name="Subtitle 2">
             <a:extLst>
               <a:ext uri="{FF2B5EF4-FFF2-40B4-BE49-F238E27FC236}">
-                <a16:creationId xmlns:a16="http://schemas.microsoft.com/office/drawing/2014/main" id="{95C9CA24-B4F6-B7DE-2786-6AF326183470}"/>
+                <a16:creationId xmlns:a16="http://schemas.microsoft.com/office/drawing/2014/main" id="{4B304A93-230C-E0DF-5087-F9D823EAB9CF}"/>
               </a:ext>
             </a:extLst>
           </p:cNvPr>
@@ -4177,8 +4190,8 @@
           <a:lstStyle/>
           <a:p>
             <a:r>
-              <a:rPr lang="en-TR" dirty="0"/>
-              <a:t>Creational (Yaratımsal), Structural (Yapısal), Behoviral (Davranışsal)</a:t>
+              <a:rPr lang="en-TR" b="1" dirty="0"/>
+              <a:t>Behoviral (Davranışsal)</a:t>
             </a:r>
           </a:p>
           <a:p>
@@ -4203,7 +4216,7 @@
           <p:cNvPr id="5" name="Straight Connector 4">
             <a:extLst>
               <a:ext uri="{FF2B5EF4-FFF2-40B4-BE49-F238E27FC236}">
-                <a16:creationId xmlns:a16="http://schemas.microsoft.com/office/drawing/2014/main" id="{A3B7EFEE-88F0-2AF2-975C-0257BCB8F605}"/>
+                <a16:creationId xmlns:a16="http://schemas.microsoft.com/office/drawing/2014/main" id="{A73E17AD-68C8-55FF-AEDA-70629A3AACF8}"/>
               </a:ext>
             </a:extLst>
           </p:cNvPr>
@@ -4237,7 +4250,7 @@
     </p:spTree>
     <p:extLst>
       <p:ext uri="{BB962C8B-B14F-4D97-AF65-F5344CB8AC3E}">
-        <p14:creationId xmlns:p14="http://schemas.microsoft.com/office/powerpoint/2010/main" val="3029469045"/>
+        <p14:creationId xmlns:p14="http://schemas.microsoft.com/office/powerpoint/2010/main" val="1652395033"/>
       </p:ext>
     </p:extLst>
   </p:cSld>
@@ -4248,148 +4261,6 @@
 </file>
 
 <file path=ppt/slides/slide13.xml><?xml version="1.0" encoding="utf-8"?>
-<p:sld xmlns:a="http://schemas.openxmlformats.org/drawingml/2006/main" xmlns:r="http://schemas.openxmlformats.org/officeDocument/2006/relationships" xmlns:p="http://schemas.openxmlformats.org/presentationml/2006/main">
-  <p:cSld>
-    <p:spTree>
-      <p:nvGrpSpPr>
-        <p:cNvPr id="1" name="">
-          <a:extLst>
-            <a:ext uri="{FF2B5EF4-FFF2-40B4-BE49-F238E27FC236}">
-              <a16:creationId xmlns:a16="http://schemas.microsoft.com/office/drawing/2014/main" id="{78297248-79B0-F15F-4FD3-46D51A0D0542}"/>
-            </a:ext>
-          </a:extLst>
-        </p:cNvPr>
-        <p:cNvGrpSpPr/>
-        <p:nvPr/>
-      </p:nvGrpSpPr>
-      <p:grpSpPr>
-        <a:xfrm>
-          <a:off x="0" y="0"/>
-          <a:ext cx="0" cy="0"/>
-          <a:chOff x="0" y="0"/>
-          <a:chExt cx="0" cy="0"/>
-        </a:xfrm>
-      </p:grpSpPr>
-      <p:sp>
-        <p:nvSpPr>
-          <p:cNvPr id="2" name="Title 1">
-            <a:extLst>
-              <a:ext uri="{FF2B5EF4-FFF2-40B4-BE49-F238E27FC236}">
-                <a16:creationId xmlns:a16="http://schemas.microsoft.com/office/drawing/2014/main" id="{5511482B-2B50-8FC9-3F3F-683BF33DAA39}"/>
-              </a:ext>
-            </a:extLst>
-          </p:cNvPr>
-          <p:cNvSpPr>
-            <a:spLocks noGrp="1"/>
-          </p:cNvSpPr>
-          <p:nvPr>
-            <p:ph type="title"/>
-          </p:nvPr>
-        </p:nvSpPr>
-        <p:spPr/>
-        <p:txBody>
-          <a:bodyPr/>
-          <a:lstStyle/>
-          <a:p>
-            <a:r>
-              <a:rPr lang="en-TR" b="1" dirty="0"/>
-              <a:t>Behoviral - Davranışsal</a:t>
-            </a:r>
-          </a:p>
-        </p:txBody>
-      </p:sp>
-      <p:sp>
-        <p:nvSpPr>
-          <p:cNvPr id="3" name="Content Placeholder 2">
-            <a:extLst>
-              <a:ext uri="{FF2B5EF4-FFF2-40B4-BE49-F238E27FC236}">
-                <a16:creationId xmlns:a16="http://schemas.microsoft.com/office/drawing/2014/main" id="{7F1DFA61-4491-A3FE-F99C-5C5F99AA29C9}"/>
-              </a:ext>
-            </a:extLst>
-          </p:cNvPr>
-          <p:cNvSpPr>
-            <a:spLocks noGrp="1"/>
-          </p:cNvSpPr>
-          <p:nvPr>
-            <p:ph idx="1"/>
-          </p:nvPr>
-        </p:nvSpPr>
-        <p:spPr/>
-        <p:txBody>
-          <a:bodyPr>
-            <a:normAutofit lnSpcReduction="10000"/>
-          </a:bodyPr>
-          <a:lstStyle/>
-          <a:p>
-            <a:r>
-              <a:rPr lang="en-TR" dirty="0"/>
-              <a:t>Strategy</a:t>
-            </a:r>
-          </a:p>
-          <a:p>
-            <a:r>
-              <a:rPr lang="en-TR" dirty="0"/>
-              <a:t>Command</a:t>
-            </a:r>
-          </a:p>
-          <a:p>
-            <a:r>
-              <a:rPr lang="en-TR" dirty="0"/>
-              <a:t>Template Method</a:t>
-            </a:r>
-          </a:p>
-          <a:p>
-            <a:r>
-              <a:rPr lang="en-TR" b="1" dirty="0"/>
-              <a:t>Observer</a:t>
-            </a:r>
-          </a:p>
-          <a:p>
-            <a:r>
-              <a:rPr lang="en-TR" dirty="0"/>
-              <a:t>Memento</a:t>
-            </a:r>
-          </a:p>
-          <a:p>
-            <a:r>
-              <a:rPr lang="en-TR" dirty="0"/>
-              <a:t>Mediator</a:t>
-            </a:r>
-          </a:p>
-          <a:p>
-            <a:r>
-              <a:rPr lang="en-TR" dirty="0"/>
-              <a:t>Chain Of Responsibility</a:t>
-            </a:r>
-          </a:p>
-          <a:p>
-            <a:r>
-              <a:rPr lang="en-TR" dirty="0"/>
-              <a:t>Visitor</a:t>
-            </a:r>
-          </a:p>
-          <a:p>
-            <a:r>
-              <a:rPr lang="en-TR" dirty="0"/>
-              <a:t>State</a:t>
-            </a:r>
-          </a:p>
-        </p:txBody>
-      </p:sp>
-    </p:spTree>
-    <p:extLst>
-      <p:ext uri="{BB962C8B-B14F-4D97-AF65-F5344CB8AC3E}">
-        <p14:creationId xmlns:p14="http://schemas.microsoft.com/office/powerpoint/2010/main" val="1937693465"/>
-      </p:ext>
-    </p:extLst>
-  </p:cSld>
-  <p:clrMapOvr>
-    <a:masterClrMapping/>
-  </p:clrMapOvr>
-</p:sld>
-</file>
-
-<file path=ppt/slides/slide14.xml><?xml version="1.0" encoding="utf-8"?>
 <p:sld xmlns:a="http://schemas.openxmlformats.org/drawingml/2006/main" xmlns:r="http://schemas.openxmlformats.org/officeDocument/2006/relationships" xmlns:p="http://schemas.openxmlformats.org/presentationml/2006/main">
   <p:cSld>
     <p:spTree>
@@ -4692,7 +4563,7 @@
 </p:sld>
 </file>
 
-<file path=ppt/slides/slide15.xml><?xml version="1.0" encoding="utf-8"?>
+<file path=ppt/slides/slide14.xml><?xml version="1.0" encoding="utf-8"?>
 <p:sld xmlns:a="http://schemas.openxmlformats.org/drawingml/2006/main" xmlns:r="http://schemas.openxmlformats.org/officeDocument/2006/relationships" xmlns:p="http://schemas.openxmlformats.org/presentationml/2006/main">
   <p:cSld>
     <p:spTree>
@@ -4944,7 +4815,7 @@
 </p:sld>
 </file>
 
-<file path=ppt/slides/slide16.xml><?xml version="1.0" encoding="utf-8"?>
+<file path=ppt/slides/slide15.xml><?xml version="1.0" encoding="utf-8"?>
 <p:sld xmlns:a="http://schemas.openxmlformats.org/drawingml/2006/main" xmlns:r="http://schemas.openxmlformats.org/officeDocument/2006/relationships" xmlns:p="http://schemas.openxmlformats.org/presentationml/2006/main">
   <p:cSld>
     <p:spTree>
@@ -5417,7 +5288,7 @@
 </p:sld>
 </file>
 
-<file path=ppt/slides/slide17.xml><?xml version="1.0" encoding="utf-8"?>
+<file path=ppt/slides/slide16.xml><?xml version="1.0" encoding="utf-8"?>
 <p:sld xmlns:a="http://schemas.openxmlformats.org/drawingml/2006/main" xmlns:r="http://schemas.openxmlformats.org/officeDocument/2006/relationships" xmlns:p="http://schemas.openxmlformats.org/presentationml/2006/main">
   <p:cSld>
     <p:spTree>
@@ -5941,7 +5812,7 @@
 </p:sld>
 </file>
 
-<file path=ppt/slides/slide18.xml><?xml version="1.0" encoding="utf-8"?>
+<file path=ppt/slides/slide17.xml><?xml version="1.0" encoding="utf-8"?>
 <p:sld xmlns:a="http://schemas.openxmlformats.org/drawingml/2006/main" xmlns:r="http://schemas.openxmlformats.org/officeDocument/2006/relationships" xmlns:p="http://schemas.openxmlformats.org/presentationml/2006/main">
   <p:cSld>
     <p:spTree>
@@ -6050,7 +5921,7 @@
 </p:sld>
 </file>
 
-<file path=ppt/slides/slide19.xml><?xml version="1.0" encoding="utf-8"?>
+<file path=ppt/slides/slide18.xml><?xml version="1.0" encoding="utf-8"?>
 <p:sld xmlns:a="http://schemas.openxmlformats.org/drawingml/2006/main" xmlns:r="http://schemas.openxmlformats.org/officeDocument/2006/relationships" xmlns:p="http://schemas.openxmlformats.org/presentationml/2006/main">
   <p:cSld>
     <p:spTree>
@@ -6191,7 +6062,7 @@
         </p:nvSpPr>
         <p:spPr>
           <a:xfrm>
-            <a:off x="838200" y="5202621"/>
+            <a:off x="838200" y="3813768"/>
             <a:ext cx="10515600" cy="1290254"/>
           </a:xfrm>
           <a:prstGeom prst="rect">
@@ -6524,6 +6395,179 @@
     <p:extLst>
       <p:ext uri="{BB962C8B-B14F-4D97-AF65-F5344CB8AC3E}">
         <p14:creationId xmlns:p14="http://schemas.microsoft.com/office/powerpoint/2010/main" val="1354386345"/>
+      </p:ext>
+    </p:extLst>
+  </p:cSld>
+  <p:clrMapOvr>
+    <a:masterClrMapping/>
+  </p:clrMapOvr>
+</p:sld>
+</file>
+
+<file path=ppt/slides/slide19.xml><?xml version="1.0" encoding="utf-8"?>
+<p:sld xmlns:a="http://schemas.openxmlformats.org/drawingml/2006/main" xmlns:r="http://schemas.openxmlformats.org/officeDocument/2006/relationships" xmlns:p="http://schemas.openxmlformats.org/presentationml/2006/main">
+  <p:cSld>
+    <p:spTree>
+      <p:nvGrpSpPr>
+        <p:cNvPr id="1" name="">
+          <a:extLst>
+            <a:ext uri="{FF2B5EF4-FFF2-40B4-BE49-F238E27FC236}">
+              <a16:creationId xmlns:a16="http://schemas.microsoft.com/office/drawing/2014/main" id="{68E0843F-29AF-6D13-4B66-D254EB782FB8}"/>
+            </a:ext>
+          </a:extLst>
+        </p:cNvPr>
+        <p:cNvGrpSpPr/>
+        <p:nvPr/>
+      </p:nvGrpSpPr>
+      <p:grpSpPr>
+        <a:xfrm>
+          <a:off x="0" y="0"/>
+          <a:ext cx="0" cy="0"/>
+          <a:chOff x="0" y="0"/>
+          <a:chExt cx="0" cy="0"/>
+        </a:xfrm>
+      </p:grpSpPr>
+      <p:sp>
+        <p:nvSpPr>
+          <p:cNvPr id="2" name="Title 1">
+            <a:extLst>
+              <a:ext uri="{FF2B5EF4-FFF2-40B4-BE49-F238E27FC236}">
+                <a16:creationId xmlns:a16="http://schemas.microsoft.com/office/drawing/2014/main" id="{40D3277F-6D14-E6DC-D56D-6F500333759C}"/>
+              </a:ext>
+            </a:extLst>
+          </p:cNvPr>
+          <p:cNvSpPr>
+            <a:spLocks noGrp="1"/>
+          </p:cNvSpPr>
+          <p:nvPr>
+            <p:ph type="ctrTitle"/>
+          </p:nvPr>
+        </p:nvSpPr>
+        <p:spPr>
+          <a:xfrm>
+            <a:off x="1524000" y="1122363"/>
+            <a:ext cx="9144000" cy="2133599"/>
+          </a:xfrm>
+        </p:spPr>
+        <p:txBody>
+          <a:bodyPr>
+            <a:normAutofit fontScale="90000"/>
+          </a:bodyPr>
+          <a:lstStyle/>
+          <a:p>
+            <a:br>
+              <a:rPr lang="en-TR" b="1" dirty="0"/>
+            </a:br>
+            <a:br>
+              <a:rPr lang="en-TR" b="1" dirty="0"/>
+            </a:br>
+            <a:br>
+              <a:rPr lang="en-TR" b="1" dirty="0"/>
+            </a:br>
+            <a:br>
+              <a:rPr lang="en-TR" b="1" dirty="0"/>
+            </a:br>
+            <a:r>
+              <a:rPr lang="en-TR" b="1" dirty="0"/>
+              <a:t>Design Pattern Series</a:t>
+            </a:r>
+            <a:br>
+              <a:rPr lang="en-TR" b="1" dirty="0"/>
+            </a:br>
+            <a:r>
+              <a:rPr lang="en-TR" sz="4200" b="1" dirty="0"/>
+              <a:t>Decorator Pattern</a:t>
+            </a:r>
+            <a:br>
+              <a:rPr lang="en-TR" b="1" dirty="0"/>
+            </a:br>
+            <a:endParaRPr lang="en-TR" b="1" dirty="0"/>
+          </a:p>
+        </p:txBody>
+      </p:sp>
+      <p:sp>
+        <p:nvSpPr>
+          <p:cNvPr id="3" name="Subtitle 2">
+            <a:extLst>
+              <a:ext uri="{FF2B5EF4-FFF2-40B4-BE49-F238E27FC236}">
+                <a16:creationId xmlns:a16="http://schemas.microsoft.com/office/drawing/2014/main" id="{2AB83D59-98BC-7FF5-F76D-D36BD744943E}"/>
+              </a:ext>
+            </a:extLst>
+          </p:cNvPr>
+          <p:cNvSpPr>
+            <a:spLocks noGrp="1"/>
+          </p:cNvSpPr>
+          <p:nvPr>
+            <p:ph type="subTitle" idx="1"/>
+          </p:nvPr>
+        </p:nvSpPr>
+        <p:spPr/>
+        <p:txBody>
+          <a:bodyPr>
+            <a:normAutofit/>
+          </a:bodyPr>
+          <a:lstStyle/>
+          <a:p>
+            <a:r>
+              <a:rPr lang="en-TR" b="1" dirty="0"/>
+              <a:t>Structural – (Yapısal)</a:t>
+            </a:r>
+            <a:endParaRPr lang="en-TR" dirty="0"/>
+          </a:p>
+          <a:p>
+            <a:endParaRPr lang="en-TR" b="1" dirty="0"/>
+          </a:p>
+          <a:p>
+            <a:r>
+              <a:rPr lang="en-TR" b="1" dirty="0"/>
+              <a:t>Someone has already solved your problems.</a:t>
+            </a:r>
+          </a:p>
+          <a:p>
+            <a:endParaRPr lang="en-TR" dirty="0"/>
+          </a:p>
+        </p:txBody>
+      </p:sp>
+      <p:cxnSp>
+        <p:nvCxnSpPr>
+          <p:cNvPr id="5" name="Straight Connector 4">
+            <a:extLst>
+              <a:ext uri="{FF2B5EF4-FFF2-40B4-BE49-F238E27FC236}">
+                <a16:creationId xmlns:a16="http://schemas.microsoft.com/office/drawing/2014/main" id="{26D0836D-5210-AD83-FC8C-549591D48833}"/>
+              </a:ext>
+            </a:extLst>
+          </p:cNvPr>
+          <p:cNvCxnSpPr/>
+          <p:nvPr/>
+        </p:nvCxnSpPr>
+        <p:spPr>
+          <a:xfrm>
+            <a:off x="1701800" y="4419600"/>
+            <a:ext cx="8695267" cy="0"/>
+          </a:xfrm>
+          <a:prstGeom prst="line">
+            <a:avLst/>
+          </a:prstGeom>
+        </p:spPr>
+        <p:style>
+          <a:lnRef idx="1">
+            <a:schemeClr val="accent1"/>
+          </a:lnRef>
+          <a:fillRef idx="0">
+            <a:schemeClr val="accent1"/>
+          </a:fillRef>
+          <a:effectRef idx="0">
+            <a:schemeClr val="accent1"/>
+          </a:effectRef>
+          <a:fontRef idx="minor">
+            <a:schemeClr val="tx1"/>
+          </a:fontRef>
+        </p:style>
+      </p:cxnSp>
+    </p:spTree>
+    <p:extLst>
+      <p:ext uri="{BB962C8B-B14F-4D97-AF65-F5344CB8AC3E}">
+        <p14:creationId xmlns:p14="http://schemas.microsoft.com/office/powerpoint/2010/main" val="1217719778"/>
       </p:ext>
     </p:extLst>
   </p:cSld>
@@ -6659,6 +6703,1804 @@
   <p:cSld>
     <p:spTree>
       <p:nvGrpSpPr>
+        <p:cNvPr id="1" name="">
+          <a:extLst>
+            <a:ext uri="{FF2B5EF4-FFF2-40B4-BE49-F238E27FC236}">
+              <a16:creationId xmlns:a16="http://schemas.microsoft.com/office/drawing/2014/main" id="{7A25ADD9-4B43-2F5B-D758-05078DFAA718}"/>
+            </a:ext>
+          </a:extLst>
+        </p:cNvPr>
+        <p:cNvGrpSpPr/>
+        <p:nvPr/>
+      </p:nvGrpSpPr>
+      <p:grpSpPr>
+        <a:xfrm>
+          <a:off x="0" y="0"/>
+          <a:ext cx="0" cy="0"/>
+          <a:chOff x="0" y="0"/>
+          <a:chExt cx="0" cy="0"/>
+        </a:xfrm>
+      </p:grpSpPr>
+      <p:sp>
+        <p:nvSpPr>
+          <p:cNvPr id="2" name="Title 1">
+            <a:extLst>
+              <a:ext uri="{FF2B5EF4-FFF2-40B4-BE49-F238E27FC236}">
+                <a16:creationId xmlns:a16="http://schemas.microsoft.com/office/drawing/2014/main" id="{77CCE722-CA90-9871-FD89-2209F77D757D}"/>
+              </a:ext>
+            </a:extLst>
+          </p:cNvPr>
+          <p:cNvSpPr>
+            <a:spLocks noGrp="1"/>
+          </p:cNvSpPr>
+          <p:nvPr>
+            <p:ph type="title"/>
+          </p:nvPr>
+        </p:nvSpPr>
+        <p:spPr/>
+        <p:txBody>
+          <a:bodyPr/>
+          <a:lstStyle/>
+          <a:p>
+            <a:r>
+              <a:rPr lang="en-TR" b="1" dirty="0"/>
+              <a:t>Decorator Pattern</a:t>
+            </a:r>
+          </a:p>
+        </p:txBody>
+      </p:sp>
+      <p:sp>
+        <p:nvSpPr>
+          <p:cNvPr id="3" name="Content Placeholder 2">
+            <a:extLst>
+              <a:ext uri="{FF2B5EF4-FFF2-40B4-BE49-F238E27FC236}">
+                <a16:creationId xmlns:a16="http://schemas.microsoft.com/office/drawing/2014/main" id="{3373D8B0-4801-1C61-3861-75C9F56F090D}"/>
+              </a:ext>
+            </a:extLst>
+          </p:cNvPr>
+          <p:cNvSpPr>
+            <a:spLocks noGrp="1"/>
+          </p:cNvSpPr>
+          <p:nvPr>
+            <p:ph idx="1"/>
+          </p:nvPr>
+        </p:nvSpPr>
+        <p:spPr/>
+        <p:txBody>
+          <a:bodyPr/>
+          <a:lstStyle/>
+          <a:p>
+            <a:r>
+              <a:rPr lang="en-US" dirty="0">
+                <a:effectLst/>
+                <a:latin typeface="Helvetica" pitchFamily="2" charset="0"/>
+              </a:rPr>
+              <a:t>Attach additional responsibilities to an object dynamically. Decorators provide a flexible alternative to subclassing for extending functionality. </a:t>
+            </a:r>
+          </a:p>
+          <a:p>
+            <a:endParaRPr lang="en-US" dirty="0">
+              <a:latin typeface="Helvetica" pitchFamily="2" charset="0"/>
+            </a:endParaRPr>
+          </a:p>
+          <a:p>
+            <a:r>
+              <a:rPr lang="en-US" dirty="0" err="1">
+                <a:latin typeface="Helvetica" pitchFamily="2" charset="0"/>
+              </a:rPr>
+              <a:t>Nesneye</a:t>
+            </a:r>
+            <a:r>
+              <a:rPr lang="en-US" dirty="0">
+                <a:latin typeface="Helvetica" pitchFamily="2" charset="0"/>
+              </a:rPr>
+              <a:t> </a:t>
+            </a:r>
+            <a:r>
+              <a:rPr lang="en-US" dirty="0" err="1">
+                <a:latin typeface="Helvetica" pitchFamily="2" charset="0"/>
+              </a:rPr>
+              <a:t>dinamik</a:t>
+            </a:r>
+            <a:r>
+              <a:rPr lang="en-US" dirty="0">
+                <a:latin typeface="Helvetica" pitchFamily="2" charset="0"/>
+              </a:rPr>
+              <a:t> </a:t>
+            </a:r>
+            <a:r>
+              <a:rPr lang="en-US" dirty="0" err="1">
+                <a:latin typeface="Helvetica" pitchFamily="2" charset="0"/>
+              </a:rPr>
+              <a:t>olarak</a:t>
+            </a:r>
+            <a:r>
+              <a:rPr lang="en-US" dirty="0">
+                <a:latin typeface="Helvetica" pitchFamily="2" charset="0"/>
+              </a:rPr>
+              <a:t> ek </a:t>
+            </a:r>
+            <a:r>
+              <a:rPr lang="en-US" dirty="0" err="1">
+                <a:latin typeface="Helvetica" pitchFamily="2" charset="0"/>
+              </a:rPr>
+              <a:t>sorumluluklar</a:t>
+            </a:r>
+            <a:r>
+              <a:rPr lang="en-US" dirty="0">
+                <a:latin typeface="Helvetica" pitchFamily="2" charset="0"/>
+              </a:rPr>
+              <a:t> </a:t>
+            </a:r>
+            <a:r>
+              <a:rPr lang="en-US" dirty="0" err="1">
+                <a:latin typeface="Helvetica" pitchFamily="2" charset="0"/>
+              </a:rPr>
+              <a:t>ekleyin</a:t>
+            </a:r>
+            <a:r>
+              <a:rPr lang="en-US" dirty="0">
+                <a:latin typeface="Helvetica" pitchFamily="2" charset="0"/>
+              </a:rPr>
+              <a:t>. </a:t>
+            </a:r>
+            <a:r>
+              <a:rPr lang="en-US" dirty="0" err="1">
+                <a:latin typeface="Helvetica" pitchFamily="2" charset="0"/>
+              </a:rPr>
+              <a:t>Dekoratörler</a:t>
+            </a:r>
+            <a:r>
+              <a:rPr lang="en-US" dirty="0">
+                <a:latin typeface="Helvetica" pitchFamily="2" charset="0"/>
+              </a:rPr>
+              <a:t>, </a:t>
+            </a:r>
+            <a:r>
+              <a:rPr lang="en-US" dirty="0" err="1">
+                <a:latin typeface="Helvetica" pitchFamily="2" charset="0"/>
+              </a:rPr>
+              <a:t>işlevselliği</a:t>
+            </a:r>
+            <a:r>
+              <a:rPr lang="en-US" dirty="0">
+                <a:latin typeface="Helvetica" pitchFamily="2" charset="0"/>
+              </a:rPr>
+              <a:t> </a:t>
+            </a:r>
+            <a:r>
+              <a:rPr lang="en-US" dirty="0" err="1">
+                <a:latin typeface="Helvetica" pitchFamily="2" charset="0"/>
+              </a:rPr>
+              <a:t>genişletmek</a:t>
+            </a:r>
+            <a:r>
+              <a:rPr lang="en-US" dirty="0">
+                <a:latin typeface="Helvetica" pitchFamily="2" charset="0"/>
+              </a:rPr>
+              <a:t> </a:t>
+            </a:r>
+            <a:r>
+              <a:rPr lang="en-US" dirty="0" err="1">
+                <a:latin typeface="Helvetica" pitchFamily="2" charset="0"/>
+              </a:rPr>
+              <a:t>için</a:t>
+            </a:r>
+            <a:r>
+              <a:rPr lang="en-US" dirty="0">
+                <a:latin typeface="Helvetica" pitchFamily="2" charset="0"/>
+              </a:rPr>
+              <a:t> alt </a:t>
+            </a:r>
+            <a:r>
+              <a:rPr lang="en-US" dirty="0" err="1">
+                <a:latin typeface="Helvetica" pitchFamily="2" charset="0"/>
+              </a:rPr>
+              <a:t>sınıflandırmaya</a:t>
+            </a:r>
+            <a:r>
+              <a:rPr lang="en-US" dirty="0">
+                <a:latin typeface="Helvetica" pitchFamily="2" charset="0"/>
+              </a:rPr>
+              <a:t> </a:t>
+            </a:r>
+            <a:r>
+              <a:rPr lang="en-US" dirty="0" err="1">
+                <a:latin typeface="Helvetica" pitchFamily="2" charset="0"/>
+              </a:rPr>
+              <a:t>esnek</a:t>
+            </a:r>
+            <a:r>
+              <a:rPr lang="en-US" dirty="0">
+                <a:latin typeface="Helvetica" pitchFamily="2" charset="0"/>
+              </a:rPr>
+              <a:t> </a:t>
+            </a:r>
+            <a:r>
+              <a:rPr lang="en-US" dirty="0" err="1">
+                <a:latin typeface="Helvetica" pitchFamily="2" charset="0"/>
+              </a:rPr>
+              <a:t>bir</a:t>
+            </a:r>
+            <a:r>
+              <a:rPr lang="en-US" dirty="0">
+                <a:latin typeface="Helvetica" pitchFamily="2" charset="0"/>
+              </a:rPr>
+              <a:t> </a:t>
+            </a:r>
+            <a:r>
+              <a:rPr lang="en-US" dirty="0" err="1">
+                <a:latin typeface="Helvetica" pitchFamily="2" charset="0"/>
+              </a:rPr>
+              <a:t>alternatiflik</a:t>
+            </a:r>
+            <a:r>
+              <a:rPr lang="en-US" dirty="0">
+                <a:latin typeface="Helvetica" pitchFamily="2" charset="0"/>
+              </a:rPr>
+              <a:t> </a:t>
+            </a:r>
+            <a:r>
+              <a:rPr lang="en-US" dirty="0" err="1">
+                <a:latin typeface="Helvetica" pitchFamily="2" charset="0"/>
+              </a:rPr>
+              <a:t>sunar</a:t>
+            </a:r>
+            <a:r>
+              <a:rPr lang="en-US" dirty="0">
+                <a:latin typeface="Helvetica" pitchFamily="2" charset="0"/>
+              </a:rPr>
+              <a:t>.</a:t>
+            </a:r>
+          </a:p>
+        </p:txBody>
+      </p:sp>
+    </p:spTree>
+    <p:extLst>
+      <p:ext uri="{BB962C8B-B14F-4D97-AF65-F5344CB8AC3E}">
+        <p14:creationId xmlns:p14="http://schemas.microsoft.com/office/powerpoint/2010/main" val="834176029"/>
+      </p:ext>
+    </p:extLst>
+  </p:cSld>
+  <p:clrMapOvr>
+    <a:masterClrMapping/>
+  </p:clrMapOvr>
+</p:sld>
+</file>
+
+<file path=ppt/slides/slide21.xml><?xml version="1.0" encoding="utf-8"?>
+<p:sld xmlns:a="http://schemas.openxmlformats.org/drawingml/2006/main" xmlns:r="http://schemas.openxmlformats.org/officeDocument/2006/relationships" xmlns:p="http://schemas.openxmlformats.org/presentationml/2006/main">
+  <p:cSld>
+    <p:spTree>
+      <p:nvGrpSpPr>
+        <p:cNvPr id="1" name="">
+          <a:extLst>
+            <a:ext uri="{FF2B5EF4-FFF2-40B4-BE49-F238E27FC236}">
+              <a16:creationId xmlns:a16="http://schemas.microsoft.com/office/drawing/2014/main" id="{C83CEF1F-001C-D12F-AD44-CC004DD65576}"/>
+            </a:ext>
+          </a:extLst>
+        </p:cNvPr>
+        <p:cNvGrpSpPr/>
+        <p:nvPr/>
+      </p:nvGrpSpPr>
+      <p:grpSpPr>
+        <a:xfrm>
+          <a:off x="0" y="0"/>
+          <a:ext cx="0" cy="0"/>
+          <a:chOff x="0" y="0"/>
+          <a:chExt cx="0" cy="0"/>
+        </a:xfrm>
+      </p:grpSpPr>
+      <p:sp>
+        <p:nvSpPr>
+          <p:cNvPr id="2" name="Title 1">
+            <a:extLst>
+              <a:ext uri="{FF2B5EF4-FFF2-40B4-BE49-F238E27FC236}">
+                <a16:creationId xmlns:a16="http://schemas.microsoft.com/office/drawing/2014/main" id="{FB944EFD-3693-A271-0227-CCC0ECC5576A}"/>
+              </a:ext>
+            </a:extLst>
+          </p:cNvPr>
+          <p:cNvSpPr>
+            <a:spLocks noGrp="1"/>
+          </p:cNvSpPr>
+          <p:nvPr>
+            <p:ph type="title"/>
+          </p:nvPr>
+        </p:nvSpPr>
+        <p:spPr/>
+        <p:txBody>
+          <a:bodyPr/>
+          <a:lstStyle/>
+          <a:p>
+            <a:r>
+              <a:rPr lang="en-TR" b="1" dirty="0"/>
+              <a:t>Sorun</a:t>
+            </a:r>
+          </a:p>
+        </p:txBody>
+      </p:sp>
+      <p:sp>
+        <p:nvSpPr>
+          <p:cNvPr id="3" name="Content Placeholder 2">
+            <a:extLst>
+              <a:ext uri="{FF2B5EF4-FFF2-40B4-BE49-F238E27FC236}">
+                <a16:creationId xmlns:a16="http://schemas.microsoft.com/office/drawing/2014/main" id="{B51F1877-9A9B-742E-96C1-2B16B996E672}"/>
+              </a:ext>
+            </a:extLst>
+          </p:cNvPr>
+          <p:cNvSpPr>
+            <a:spLocks noGrp="1"/>
+          </p:cNvSpPr>
+          <p:nvPr>
+            <p:ph idx="1"/>
+          </p:nvPr>
+        </p:nvSpPr>
+        <p:spPr/>
+        <p:txBody>
+          <a:bodyPr/>
+          <a:lstStyle/>
+          <a:p>
+            <a:pPr algn="just"/>
+            <a:r>
+              <a:rPr lang="en-US" dirty="0"/>
+              <a:t>Class explosion ??</a:t>
+            </a:r>
+          </a:p>
+          <a:p>
+            <a:pPr algn="just"/>
+            <a:endParaRPr lang="en-US" dirty="0"/>
+          </a:p>
+          <a:p>
+            <a:pPr algn="just"/>
+            <a:endParaRPr lang="en-US" dirty="0"/>
+          </a:p>
+          <a:p>
+            <a:pPr marL="0" indent="0" algn="just">
+              <a:buNone/>
+            </a:pPr>
+            <a:endParaRPr lang="en-US" dirty="0"/>
+          </a:p>
+          <a:p>
+            <a:pPr algn="just"/>
+            <a:r>
+              <a:rPr lang="en-US" dirty="0" err="1"/>
+              <a:t>Farklı</a:t>
+            </a:r>
+            <a:r>
+              <a:rPr lang="en-US" dirty="0"/>
+              <a:t> </a:t>
+            </a:r>
+            <a:r>
+              <a:rPr lang="en-US" dirty="0" err="1"/>
+              <a:t>bir</a:t>
+            </a:r>
+            <a:r>
+              <a:rPr lang="en-US" dirty="0"/>
+              <a:t> </a:t>
+            </a:r>
+            <a:r>
+              <a:rPr lang="en-US" dirty="0" err="1"/>
+              <a:t>çözüm</a:t>
+            </a:r>
+            <a:r>
+              <a:rPr lang="en-US" dirty="0"/>
+              <a:t> </a:t>
+            </a:r>
+            <a:r>
+              <a:rPr lang="en-US" dirty="0" err="1"/>
+              <a:t>yeterli</a:t>
+            </a:r>
+            <a:r>
+              <a:rPr lang="en-US" dirty="0"/>
+              <a:t> </a:t>
+            </a:r>
+            <a:r>
+              <a:rPr lang="en-US" dirty="0" err="1"/>
+              <a:t>olacak</a:t>
+            </a:r>
+            <a:r>
+              <a:rPr lang="en-US" dirty="0"/>
+              <a:t> </a:t>
+            </a:r>
+            <a:r>
+              <a:rPr lang="en-US" dirty="0" err="1"/>
+              <a:t>mı</a:t>
+            </a:r>
+            <a:r>
+              <a:rPr lang="en-US" dirty="0"/>
+              <a:t>??</a:t>
+            </a:r>
+          </a:p>
+          <a:p>
+            <a:pPr algn="just"/>
+            <a:endParaRPr lang="en-US" dirty="0"/>
+          </a:p>
+          <a:p>
+            <a:pPr algn="just"/>
+            <a:endParaRPr lang="en-US" dirty="0"/>
+          </a:p>
+          <a:p>
+            <a:pPr algn="just"/>
+            <a:endParaRPr lang="en-US" dirty="0"/>
+          </a:p>
+          <a:p>
+            <a:endParaRPr lang="en-US" dirty="0"/>
+          </a:p>
+          <a:p>
+            <a:pPr marL="0" indent="0">
+              <a:buNone/>
+            </a:pPr>
+            <a:endParaRPr lang="en-TR" dirty="0"/>
+          </a:p>
+          <a:p>
+            <a:pPr marL="0" indent="0">
+              <a:buNone/>
+            </a:pPr>
+            <a:endParaRPr lang="en-TR" dirty="0"/>
+          </a:p>
+        </p:txBody>
+      </p:sp>
+      <p:pic>
+        <p:nvPicPr>
+          <p:cNvPr id="7" name="Picture 6">
+            <a:extLst>
+              <a:ext uri="{FF2B5EF4-FFF2-40B4-BE49-F238E27FC236}">
+                <a16:creationId xmlns:a16="http://schemas.microsoft.com/office/drawing/2014/main" id="{2D30ADEC-09A7-42E3-0F38-0846266FD820}"/>
+              </a:ext>
+            </a:extLst>
+          </p:cNvPr>
+          <p:cNvPicPr>
+            <a:picLocks noChangeAspect="1"/>
+          </p:cNvPicPr>
+          <p:nvPr/>
+        </p:nvPicPr>
+        <p:blipFill>
+          <a:blip r:embed="rId2"/>
+          <a:stretch>
+            <a:fillRect/>
+          </a:stretch>
+        </p:blipFill>
+        <p:spPr>
+          <a:xfrm>
+            <a:off x="838200" y="2409270"/>
+            <a:ext cx="10953228" cy="1416110"/>
+          </a:xfrm>
+          <a:prstGeom prst="rect">
+            <a:avLst/>
+          </a:prstGeom>
+        </p:spPr>
+      </p:pic>
+    </p:spTree>
+    <p:extLst>
+      <p:ext uri="{BB962C8B-B14F-4D97-AF65-F5344CB8AC3E}">
+        <p14:creationId xmlns:p14="http://schemas.microsoft.com/office/powerpoint/2010/main" val="2923422140"/>
+      </p:ext>
+    </p:extLst>
+  </p:cSld>
+  <p:clrMapOvr>
+    <a:masterClrMapping/>
+  </p:clrMapOvr>
+</p:sld>
+</file>
+
+<file path=ppt/slides/slide22.xml><?xml version="1.0" encoding="utf-8"?>
+<p:sld xmlns:a="http://schemas.openxmlformats.org/drawingml/2006/main" xmlns:r="http://schemas.openxmlformats.org/officeDocument/2006/relationships" xmlns:p="http://schemas.openxmlformats.org/presentationml/2006/main">
+  <p:cSld>
+    <p:spTree>
+      <p:nvGrpSpPr>
+        <p:cNvPr id="1" name="">
+          <a:extLst>
+            <a:ext uri="{FF2B5EF4-FFF2-40B4-BE49-F238E27FC236}">
+              <a16:creationId xmlns:a16="http://schemas.microsoft.com/office/drawing/2014/main" id="{3C075994-8D6F-7AD1-95FF-DB5F39F31331}"/>
+            </a:ext>
+          </a:extLst>
+        </p:cNvPr>
+        <p:cNvGrpSpPr/>
+        <p:nvPr/>
+      </p:nvGrpSpPr>
+      <p:grpSpPr>
+        <a:xfrm>
+          <a:off x="0" y="0"/>
+          <a:ext cx="0" cy="0"/>
+          <a:chOff x="0" y="0"/>
+          <a:chExt cx="0" cy="0"/>
+        </a:xfrm>
+      </p:grpSpPr>
+      <p:sp>
+        <p:nvSpPr>
+          <p:cNvPr id="2" name="Title 1">
+            <a:extLst>
+              <a:ext uri="{FF2B5EF4-FFF2-40B4-BE49-F238E27FC236}">
+                <a16:creationId xmlns:a16="http://schemas.microsoft.com/office/drawing/2014/main" id="{03592823-F49B-FE03-5B54-85011140F3C7}"/>
+              </a:ext>
+            </a:extLst>
+          </p:cNvPr>
+          <p:cNvSpPr>
+            <a:spLocks noGrp="1"/>
+          </p:cNvSpPr>
+          <p:nvPr>
+            <p:ph type="title"/>
+          </p:nvPr>
+        </p:nvSpPr>
+        <p:spPr/>
+        <p:txBody>
+          <a:bodyPr/>
+          <a:lstStyle/>
+          <a:p>
+            <a:r>
+              <a:rPr lang="en-TR" b="1" dirty="0"/>
+              <a:t>Tasarım Prensipleri</a:t>
+            </a:r>
+          </a:p>
+        </p:txBody>
+      </p:sp>
+      <p:sp>
+        <p:nvSpPr>
+          <p:cNvPr id="3" name="Content Placeholder 2">
+            <a:extLst>
+              <a:ext uri="{FF2B5EF4-FFF2-40B4-BE49-F238E27FC236}">
+                <a16:creationId xmlns:a16="http://schemas.microsoft.com/office/drawing/2014/main" id="{43D8601D-653D-6C8F-169B-47DEA067D877}"/>
+              </a:ext>
+            </a:extLst>
+          </p:cNvPr>
+          <p:cNvSpPr>
+            <a:spLocks noGrp="1"/>
+          </p:cNvSpPr>
+          <p:nvPr>
+            <p:ph idx="1"/>
+          </p:nvPr>
+        </p:nvSpPr>
+        <p:spPr/>
+        <p:txBody>
+          <a:bodyPr>
+            <a:normAutofit fontScale="92500" lnSpcReduction="10000"/>
+          </a:bodyPr>
+          <a:lstStyle/>
+          <a:p>
+            <a:r>
+              <a:rPr lang="en-TR" b="1" dirty="0"/>
+              <a:t>Program to interface, not implementation !</a:t>
+            </a:r>
+          </a:p>
+          <a:p>
+            <a:pPr lvl="1"/>
+            <a:r>
+              <a:rPr lang="en-TR" dirty="0"/>
+              <a:t>Program Arayüzdür, uygulama değil !</a:t>
+            </a:r>
+          </a:p>
+          <a:p>
+            <a:r>
+              <a:rPr lang="en-TR" b="1" dirty="0"/>
+              <a:t>Favor object composition over class inheritance..</a:t>
+            </a:r>
+          </a:p>
+          <a:p>
+            <a:pPr lvl="1"/>
+            <a:r>
+              <a:rPr lang="en-TR" dirty="0"/>
+              <a:t>Kalıtım yerine Kompozisyon tercih et..</a:t>
+            </a:r>
+          </a:p>
+          <a:p>
+            <a:r>
+              <a:rPr lang="en-TR" b="1" dirty="0"/>
+              <a:t>Identify the aspects of your application that vary and sep</a:t>
+            </a:r>
+            <a:r>
+              <a:rPr lang="en-US" b="1" dirty="0"/>
+              <a:t>a</a:t>
+            </a:r>
+            <a:r>
+              <a:rPr lang="en-TR" b="1" dirty="0"/>
+              <a:t>rate them from what stays the same</a:t>
+            </a:r>
+          </a:p>
+          <a:p>
+            <a:pPr lvl="1"/>
+            <a:r>
+              <a:rPr lang="en-TR" dirty="0"/>
+              <a:t>Uygulamanın değişen yönlerini belirleyin ve bunları aynı kalanlardan ayırın.</a:t>
+            </a:r>
+            <a:endParaRPr lang="en-TR" b="1" dirty="0"/>
+          </a:p>
+          <a:p>
+            <a:r>
+              <a:rPr lang="en-US" b="1" dirty="0"/>
+              <a:t>Strive for loosely coupled designs between objects that interface</a:t>
+            </a:r>
+          </a:p>
+          <a:p>
+            <a:pPr lvl="1"/>
+            <a:r>
+              <a:rPr lang="en-US" dirty="0" err="1"/>
+              <a:t>Arayüz</a:t>
+            </a:r>
+            <a:r>
+              <a:rPr lang="en-US" dirty="0"/>
+              <a:t> </a:t>
+            </a:r>
+            <a:r>
+              <a:rPr lang="en-US" dirty="0" err="1"/>
+              <a:t>oluşturan</a:t>
+            </a:r>
+            <a:r>
+              <a:rPr lang="en-US" dirty="0"/>
+              <a:t> </a:t>
+            </a:r>
+            <a:r>
+              <a:rPr lang="en-US" dirty="0" err="1"/>
+              <a:t>objeler</a:t>
+            </a:r>
+            <a:r>
+              <a:rPr lang="en-US" dirty="0"/>
+              <a:t> </a:t>
+            </a:r>
+            <a:r>
+              <a:rPr lang="en-US" dirty="0" err="1"/>
+              <a:t>arasında</a:t>
+            </a:r>
+            <a:r>
+              <a:rPr lang="en-US" dirty="0"/>
+              <a:t> loosely coupled </a:t>
+            </a:r>
+            <a:r>
+              <a:rPr lang="en-US" dirty="0" err="1"/>
+              <a:t>tasarım</a:t>
+            </a:r>
+            <a:r>
+              <a:rPr lang="en-US" dirty="0"/>
+              <a:t> </a:t>
+            </a:r>
+            <a:r>
+              <a:rPr lang="en-US" dirty="0" err="1"/>
+              <a:t>için</a:t>
+            </a:r>
+            <a:r>
+              <a:rPr lang="en-US" dirty="0"/>
+              <a:t> </a:t>
+            </a:r>
+            <a:r>
+              <a:rPr lang="en-US" dirty="0" err="1"/>
+              <a:t>çabalayın</a:t>
+            </a:r>
+            <a:r>
+              <a:rPr lang="en-US" dirty="0"/>
+              <a:t>.</a:t>
+            </a:r>
+            <a:endParaRPr lang="en-TR" dirty="0"/>
+          </a:p>
+          <a:p>
+            <a:r>
+              <a:rPr lang="en-US" b="1" dirty="0">
+                <a:effectLst/>
+              </a:rPr>
+              <a:t>Classes should be open for extension, but closed for modification</a:t>
+            </a:r>
+          </a:p>
+          <a:p>
+            <a:pPr lvl="1"/>
+            <a:r>
+              <a:rPr lang="en-TR" dirty="0"/>
+              <a:t>Sınıflar genişletilmeye açık fakat modifikasyona kapalı olmalıdır.</a:t>
+            </a:r>
+          </a:p>
+          <a:p>
+            <a:endParaRPr lang="en-TR" dirty="0"/>
+          </a:p>
+        </p:txBody>
+      </p:sp>
+    </p:spTree>
+    <p:extLst>
+      <p:ext uri="{BB962C8B-B14F-4D97-AF65-F5344CB8AC3E}">
+        <p14:creationId xmlns:p14="http://schemas.microsoft.com/office/powerpoint/2010/main" val="3410948956"/>
+      </p:ext>
+    </p:extLst>
+  </p:cSld>
+  <p:clrMapOvr>
+    <a:masterClrMapping/>
+  </p:clrMapOvr>
+</p:sld>
+</file>
+
+<file path=ppt/slides/slide23.xml><?xml version="1.0" encoding="utf-8"?>
+<p:sld xmlns:a="http://schemas.openxmlformats.org/drawingml/2006/main" xmlns:r="http://schemas.openxmlformats.org/officeDocument/2006/relationships" xmlns:p="http://schemas.openxmlformats.org/presentationml/2006/main">
+  <p:cSld>
+    <p:spTree>
+      <p:nvGrpSpPr>
+        <p:cNvPr id="1" name="">
+          <a:extLst>
+            <a:ext uri="{FF2B5EF4-FFF2-40B4-BE49-F238E27FC236}">
+              <a16:creationId xmlns:a16="http://schemas.microsoft.com/office/drawing/2014/main" id="{6A985687-8288-63F6-10A0-B35D2EBA852E}"/>
+            </a:ext>
+          </a:extLst>
+        </p:cNvPr>
+        <p:cNvGrpSpPr/>
+        <p:nvPr/>
+      </p:nvGrpSpPr>
+      <p:grpSpPr>
+        <a:xfrm>
+          <a:off x="0" y="0"/>
+          <a:ext cx="0" cy="0"/>
+          <a:chOff x="0" y="0"/>
+          <a:chExt cx="0" cy="0"/>
+        </a:xfrm>
+      </p:grpSpPr>
+      <p:sp>
+        <p:nvSpPr>
+          <p:cNvPr id="2" name="Title 1">
+            <a:extLst>
+              <a:ext uri="{FF2B5EF4-FFF2-40B4-BE49-F238E27FC236}">
+                <a16:creationId xmlns:a16="http://schemas.microsoft.com/office/drawing/2014/main" id="{9CC28E9B-71AE-5AE3-F94D-6DAB7113BDD7}"/>
+              </a:ext>
+            </a:extLst>
+          </p:cNvPr>
+          <p:cNvSpPr>
+            <a:spLocks noGrp="1"/>
+          </p:cNvSpPr>
+          <p:nvPr>
+            <p:ph type="title"/>
+          </p:nvPr>
+        </p:nvSpPr>
+        <p:spPr>
+          <a:xfrm>
+            <a:off x="838200" y="176768"/>
+            <a:ext cx="9966434" cy="591316"/>
+          </a:xfrm>
+        </p:spPr>
+        <p:txBody>
+          <a:bodyPr>
+            <a:normAutofit fontScale="90000"/>
+          </a:bodyPr>
+          <a:lstStyle/>
+          <a:p>
+            <a:r>
+              <a:rPr lang="en-TR" b="1" dirty="0"/>
+              <a:t>Decorator Pattern</a:t>
+            </a:r>
+          </a:p>
+        </p:txBody>
+      </p:sp>
+      <p:sp>
+        <p:nvSpPr>
+          <p:cNvPr id="6" name="TextBox 5">
+            <a:extLst>
+              <a:ext uri="{FF2B5EF4-FFF2-40B4-BE49-F238E27FC236}">
+                <a16:creationId xmlns:a16="http://schemas.microsoft.com/office/drawing/2014/main" id="{FA629B2B-1CF3-3A3C-064C-1BE8E627963B}"/>
+              </a:ext>
+            </a:extLst>
+          </p:cNvPr>
+          <p:cNvSpPr txBox="1"/>
+          <p:nvPr/>
+        </p:nvSpPr>
+        <p:spPr>
+          <a:xfrm>
+            <a:off x="838199" y="6389537"/>
+            <a:ext cx="8167777" cy="369332"/>
+          </a:xfrm>
+          <a:prstGeom prst="rect">
+            <a:avLst/>
+          </a:prstGeom>
+          <a:noFill/>
+        </p:spPr>
+        <p:txBody>
+          <a:bodyPr wrap="square">
+            <a:spAutoFit/>
+          </a:bodyPr>
+          <a:lstStyle/>
+          <a:p>
+            <a:r>
+              <a:rPr lang="en-US" b="1" dirty="0">
+                <a:effectLst/>
+                <a:latin typeface="Helvetica" pitchFamily="2" charset="0"/>
+              </a:rPr>
+              <a:t>Classes should be open for extension, but closed for modification</a:t>
+            </a:r>
+          </a:p>
+        </p:txBody>
+      </p:sp>
+      <p:sp>
+        <p:nvSpPr>
+          <p:cNvPr id="9" name="Content Placeholder 8">
+            <a:extLst>
+              <a:ext uri="{FF2B5EF4-FFF2-40B4-BE49-F238E27FC236}">
+                <a16:creationId xmlns:a16="http://schemas.microsoft.com/office/drawing/2014/main" id="{04500F8B-F542-45A9-C862-4FDF72BA0A77}"/>
+              </a:ext>
+            </a:extLst>
+          </p:cNvPr>
+          <p:cNvSpPr>
+            <a:spLocks noGrp="1"/>
+          </p:cNvSpPr>
+          <p:nvPr>
+            <p:ph idx="1"/>
+          </p:nvPr>
+        </p:nvSpPr>
+        <p:spPr>
+          <a:xfrm>
+            <a:off x="838200" y="3931541"/>
+            <a:ext cx="10515600" cy="2393757"/>
+          </a:xfrm>
+        </p:spPr>
+        <p:txBody>
+          <a:bodyPr>
+            <a:normAutofit fontScale="85000" lnSpcReduction="10000"/>
+          </a:bodyPr>
+          <a:lstStyle/>
+          <a:p>
+            <a:r>
+              <a:rPr lang="en-TR" b="1" dirty="0"/>
+              <a:t>Component: </a:t>
+            </a:r>
+            <a:r>
+              <a:rPr lang="en-US" dirty="0" err="1"/>
+              <a:t>Dinamik</a:t>
+            </a:r>
+            <a:r>
+              <a:rPr lang="en-US" dirty="0"/>
+              <a:t> </a:t>
+            </a:r>
+            <a:r>
+              <a:rPr lang="en-US" dirty="0" err="1"/>
+              <a:t>olarak</a:t>
+            </a:r>
+            <a:r>
+              <a:rPr lang="en-US" dirty="0"/>
+              <a:t> </a:t>
+            </a:r>
+            <a:r>
+              <a:rPr lang="en-US" dirty="0" err="1"/>
+              <a:t>sorumluluk</a:t>
+            </a:r>
+            <a:r>
+              <a:rPr lang="en-US" dirty="0"/>
+              <a:t> </a:t>
+            </a:r>
+            <a:r>
+              <a:rPr lang="en-US" dirty="0" err="1"/>
+              <a:t>eklenebilecek</a:t>
+            </a:r>
+            <a:r>
+              <a:rPr lang="en-US" dirty="0"/>
+              <a:t> </a:t>
+            </a:r>
+            <a:r>
+              <a:rPr lang="en-US" dirty="0" err="1"/>
+              <a:t>nesneler</a:t>
+            </a:r>
+            <a:r>
+              <a:rPr lang="en-US" dirty="0"/>
+              <a:t> </a:t>
+            </a:r>
+            <a:r>
+              <a:rPr lang="en-US" dirty="0" err="1"/>
+              <a:t>için</a:t>
+            </a:r>
+            <a:r>
+              <a:rPr lang="en-US" dirty="0"/>
+              <a:t> </a:t>
+            </a:r>
+            <a:r>
+              <a:rPr lang="en-US" dirty="0" err="1"/>
+              <a:t>arayüzü</a:t>
+            </a:r>
+            <a:r>
+              <a:rPr lang="en-US" dirty="0"/>
+              <a:t> </a:t>
+            </a:r>
+            <a:r>
+              <a:rPr lang="en-US" dirty="0" err="1"/>
+              <a:t>tanımlar</a:t>
+            </a:r>
+            <a:r>
+              <a:rPr lang="en-US" dirty="0"/>
+              <a:t>.</a:t>
+            </a:r>
+          </a:p>
+          <a:p>
+            <a:r>
+              <a:rPr lang="en-US" b="1" dirty="0" err="1"/>
+              <a:t>ConcreteComponent</a:t>
+            </a:r>
+            <a:r>
+              <a:rPr lang="en-US" b="1" dirty="0"/>
+              <a:t>:  </a:t>
+            </a:r>
+            <a:r>
+              <a:rPr lang="en-US" dirty="0"/>
+              <a:t>Ek </a:t>
+            </a:r>
+            <a:r>
+              <a:rPr lang="en-US" dirty="0" err="1"/>
+              <a:t>sorumlulukların</a:t>
+            </a:r>
+            <a:r>
+              <a:rPr lang="en-US" dirty="0"/>
+              <a:t> </a:t>
+            </a:r>
+            <a:r>
+              <a:rPr lang="en-US" dirty="0" err="1"/>
+              <a:t>yüklenebileceği</a:t>
+            </a:r>
+            <a:r>
+              <a:rPr lang="en-US" dirty="0"/>
+              <a:t> </a:t>
+            </a:r>
+            <a:r>
+              <a:rPr lang="en-US" dirty="0" err="1"/>
+              <a:t>bir</a:t>
+            </a:r>
+            <a:r>
+              <a:rPr lang="en-US" dirty="0"/>
+              <a:t> </a:t>
+            </a:r>
+            <a:r>
+              <a:rPr lang="en-US" dirty="0" err="1"/>
+              <a:t>nesneyi</a:t>
+            </a:r>
+            <a:r>
+              <a:rPr lang="en-US" dirty="0"/>
+              <a:t> </a:t>
+            </a:r>
+            <a:r>
+              <a:rPr lang="en-US" dirty="0" err="1"/>
+              <a:t>tanımlar</a:t>
+            </a:r>
+            <a:r>
+              <a:rPr lang="en-US" dirty="0"/>
+              <a:t>.</a:t>
+            </a:r>
+          </a:p>
+          <a:p>
+            <a:r>
+              <a:rPr lang="en-US" b="1" dirty="0"/>
+              <a:t>Decorator: </a:t>
+            </a:r>
+            <a:r>
+              <a:rPr lang="en-US" dirty="0"/>
+              <a:t>Bir Component </a:t>
+            </a:r>
+            <a:r>
+              <a:rPr lang="en-US" dirty="0" err="1"/>
+              <a:t>nesnesine</a:t>
+            </a:r>
+            <a:r>
+              <a:rPr lang="en-US" dirty="0"/>
+              <a:t> </a:t>
+            </a:r>
+            <a:r>
+              <a:rPr lang="en-US" dirty="0" err="1"/>
+              <a:t>olan</a:t>
+            </a:r>
+            <a:r>
+              <a:rPr lang="en-US" dirty="0"/>
+              <a:t> </a:t>
+            </a:r>
+            <a:r>
+              <a:rPr lang="en-US" dirty="0" err="1"/>
+              <a:t>referansı</a:t>
+            </a:r>
+            <a:r>
+              <a:rPr lang="en-US" dirty="0"/>
+              <a:t> </a:t>
+            </a:r>
+            <a:r>
+              <a:rPr lang="en-US" dirty="0" err="1"/>
+              <a:t>korur</a:t>
+            </a:r>
+            <a:r>
+              <a:rPr lang="en-US" dirty="0"/>
+              <a:t> </a:t>
+            </a:r>
+            <a:r>
+              <a:rPr lang="en-US" dirty="0" err="1"/>
+              <a:t>ve</a:t>
+            </a:r>
+            <a:r>
+              <a:rPr lang="en-US" dirty="0"/>
+              <a:t> </a:t>
+            </a:r>
+            <a:r>
+              <a:rPr lang="en-US" dirty="0" err="1"/>
+              <a:t>Component'in</a:t>
+            </a:r>
+            <a:r>
+              <a:rPr lang="en-US" dirty="0"/>
+              <a:t> </a:t>
+            </a:r>
+            <a:r>
+              <a:rPr lang="en-US" dirty="0" err="1"/>
+              <a:t>arayüzüne</a:t>
+            </a:r>
+            <a:r>
+              <a:rPr lang="en-US" dirty="0"/>
+              <a:t> </a:t>
+            </a:r>
+            <a:r>
+              <a:rPr lang="en-US" dirty="0" err="1"/>
+              <a:t>uygun</a:t>
+            </a:r>
+            <a:r>
+              <a:rPr lang="en-US" dirty="0"/>
+              <a:t> </a:t>
+            </a:r>
+            <a:r>
+              <a:rPr lang="en-US" dirty="0" err="1"/>
+              <a:t>bir</a:t>
+            </a:r>
+            <a:r>
+              <a:rPr lang="en-US" dirty="0"/>
+              <a:t> </a:t>
+            </a:r>
+            <a:r>
+              <a:rPr lang="en-US" dirty="0" err="1"/>
+              <a:t>arayüz</a:t>
+            </a:r>
+            <a:r>
+              <a:rPr lang="en-US" dirty="0"/>
+              <a:t> </a:t>
+            </a:r>
+            <a:r>
+              <a:rPr lang="en-US" dirty="0" err="1"/>
+              <a:t>tanımlar</a:t>
+            </a:r>
+            <a:r>
+              <a:rPr lang="en-US" dirty="0"/>
+              <a:t>.</a:t>
+            </a:r>
+          </a:p>
+          <a:p>
+            <a:r>
+              <a:rPr lang="en-TR" b="1" dirty="0"/>
+              <a:t>ConcreteDecarator: </a:t>
+            </a:r>
+            <a:r>
+              <a:rPr lang="en-TR" dirty="0"/>
+              <a:t>Bileşene sorumluluklar ekler.</a:t>
+            </a:r>
+            <a:endParaRPr lang="en-TR" b="1" dirty="0"/>
+          </a:p>
+        </p:txBody>
+      </p:sp>
+      <p:pic>
+        <p:nvPicPr>
+          <p:cNvPr id="4" name="Picture 3">
+            <a:extLst>
+              <a:ext uri="{FF2B5EF4-FFF2-40B4-BE49-F238E27FC236}">
+                <a16:creationId xmlns:a16="http://schemas.microsoft.com/office/drawing/2014/main" id="{016145E0-64B5-6E70-9EDF-49E6B3100CFC}"/>
+              </a:ext>
+            </a:extLst>
+          </p:cNvPr>
+          <p:cNvPicPr>
+            <a:picLocks noChangeAspect="1"/>
+          </p:cNvPicPr>
+          <p:nvPr/>
+        </p:nvPicPr>
+        <p:blipFill>
+          <a:blip r:embed="rId2"/>
+          <a:stretch>
+            <a:fillRect/>
+          </a:stretch>
+        </p:blipFill>
+        <p:spPr>
+          <a:xfrm>
+            <a:off x="3776368" y="877663"/>
+            <a:ext cx="3792882" cy="3005859"/>
+          </a:xfrm>
+          <a:prstGeom prst="rect">
+            <a:avLst/>
+          </a:prstGeom>
+        </p:spPr>
+      </p:pic>
+    </p:spTree>
+    <p:extLst>
+      <p:ext uri="{BB962C8B-B14F-4D97-AF65-F5344CB8AC3E}">
+        <p14:creationId xmlns:p14="http://schemas.microsoft.com/office/powerpoint/2010/main" val="2293489445"/>
+      </p:ext>
+    </p:extLst>
+  </p:cSld>
+  <p:clrMapOvr>
+    <a:masterClrMapping/>
+  </p:clrMapOvr>
+</p:sld>
+</file>
+
+<file path=ppt/slides/slide24.xml><?xml version="1.0" encoding="utf-8"?>
+<p:sld xmlns:a="http://schemas.openxmlformats.org/drawingml/2006/main" xmlns:r="http://schemas.openxmlformats.org/officeDocument/2006/relationships" xmlns:p="http://schemas.openxmlformats.org/presentationml/2006/main">
+  <p:cSld>
+    <p:spTree>
+      <p:nvGrpSpPr>
+        <p:cNvPr id="1" name="">
+          <a:extLst>
+            <a:ext uri="{FF2B5EF4-FFF2-40B4-BE49-F238E27FC236}">
+              <a16:creationId xmlns:a16="http://schemas.microsoft.com/office/drawing/2014/main" id="{E9EDCF9E-35DB-AB93-A63D-89AF06BEB12B}"/>
+            </a:ext>
+          </a:extLst>
+        </p:cNvPr>
+        <p:cNvGrpSpPr/>
+        <p:nvPr/>
+      </p:nvGrpSpPr>
+      <p:grpSpPr>
+        <a:xfrm>
+          <a:off x="0" y="0"/>
+          <a:ext cx="0" cy="0"/>
+          <a:chOff x="0" y="0"/>
+          <a:chExt cx="0" cy="0"/>
+        </a:xfrm>
+      </p:grpSpPr>
+      <p:sp>
+        <p:nvSpPr>
+          <p:cNvPr id="2" name="Title 1">
+            <a:extLst>
+              <a:ext uri="{FF2B5EF4-FFF2-40B4-BE49-F238E27FC236}">
+                <a16:creationId xmlns:a16="http://schemas.microsoft.com/office/drawing/2014/main" id="{2B4DC190-6381-2EC7-85F8-2534439F4D79}"/>
+              </a:ext>
+            </a:extLst>
+          </p:cNvPr>
+          <p:cNvSpPr>
+            <a:spLocks noGrp="1"/>
+          </p:cNvSpPr>
+          <p:nvPr>
+            <p:ph type="title"/>
+          </p:nvPr>
+        </p:nvSpPr>
+        <p:spPr/>
+        <p:txBody>
+          <a:bodyPr/>
+          <a:lstStyle/>
+          <a:p>
+            <a:r>
+              <a:rPr lang="en-TR" dirty="0"/>
+              <a:t>Çözüm..</a:t>
+            </a:r>
+          </a:p>
+        </p:txBody>
+      </p:sp>
+      <p:sp>
+        <p:nvSpPr>
+          <p:cNvPr id="3" name="Content Placeholder 2">
+            <a:extLst>
+              <a:ext uri="{FF2B5EF4-FFF2-40B4-BE49-F238E27FC236}">
+                <a16:creationId xmlns:a16="http://schemas.microsoft.com/office/drawing/2014/main" id="{3AC5DF98-CA46-1110-3978-7B49D755F0E3}"/>
+              </a:ext>
+            </a:extLst>
+          </p:cNvPr>
+          <p:cNvSpPr>
+            <a:spLocks noGrp="1"/>
+          </p:cNvSpPr>
+          <p:nvPr>
+            <p:ph idx="1"/>
+          </p:nvPr>
+        </p:nvSpPr>
+        <p:spPr/>
+        <p:txBody>
+          <a:bodyPr>
+            <a:normAutofit/>
+          </a:bodyPr>
+          <a:lstStyle/>
+          <a:p>
+            <a:pPr marL="0" indent="0">
+              <a:buNone/>
+            </a:pPr>
+            <a:endParaRPr lang="en-TR" sz="5000" dirty="0"/>
+          </a:p>
+          <a:p>
+            <a:pPr marL="0" indent="0">
+              <a:buNone/>
+            </a:pPr>
+            <a:endParaRPr lang="en-TR" sz="5000" dirty="0"/>
+          </a:p>
+          <a:p>
+            <a:pPr marL="0" indent="0">
+              <a:buNone/>
+            </a:pPr>
+            <a:r>
+              <a:rPr lang="en-TR" sz="5000" dirty="0"/>
+              <a:t>Demo</a:t>
+            </a:r>
+          </a:p>
+        </p:txBody>
+      </p:sp>
+    </p:spTree>
+    <p:extLst>
+      <p:ext uri="{BB962C8B-B14F-4D97-AF65-F5344CB8AC3E}">
+        <p14:creationId xmlns:p14="http://schemas.microsoft.com/office/powerpoint/2010/main" val="1965433629"/>
+      </p:ext>
+    </p:extLst>
+  </p:cSld>
+  <p:clrMapOvr>
+    <a:masterClrMapping/>
+  </p:clrMapOvr>
+</p:sld>
+</file>
+
+<file path=ppt/slides/slide25.xml><?xml version="1.0" encoding="utf-8"?>
+<p:sld xmlns:a="http://schemas.openxmlformats.org/drawingml/2006/main" xmlns:r="http://schemas.openxmlformats.org/officeDocument/2006/relationships" xmlns:p="http://schemas.openxmlformats.org/presentationml/2006/main">
+  <p:cSld>
+    <p:spTree>
+      <p:nvGrpSpPr>
+        <p:cNvPr id="1" name="">
+          <a:extLst>
+            <a:ext uri="{FF2B5EF4-FFF2-40B4-BE49-F238E27FC236}">
+              <a16:creationId xmlns:a16="http://schemas.microsoft.com/office/drawing/2014/main" id="{7CA5E3CC-DA8B-9E2B-D70A-B938C9BDDE3B}"/>
+            </a:ext>
+          </a:extLst>
+        </p:cNvPr>
+        <p:cNvGrpSpPr/>
+        <p:nvPr/>
+      </p:nvGrpSpPr>
+      <p:grpSpPr>
+        <a:xfrm>
+          <a:off x="0" y="0"/>
+          <a:ext cx="0" cy="0"/>
+          <a:chOff x="0" y="0"/>
+          <a:chExt cx="0" cy="0"/>
+        </a:xfrm>
+      </p:grpSpPr>
+      <p:sp>
+        <p:nvSpPr>
+          <p:cNvPr id="2" name="Title 1">
+            <a:extLst>
+              <a:ext uri="{FF2B5EF4-FFF2-40B4-BE49-F238E27FC236}">
+                <a16:creationId xmlns:a16="http://schemas.microsoft.com/office/drawing/2014/main" id="{46542E33-6035-6E90-C2AD-272FEC6C54E2}"/>
+              </a:ext>
+            </a:extLst>
+          </p:cNvPr>
+          <p:cNvSpPr>
+            <a:spLocks noGrp="1"/>
+          </p:cNvSpPr>
+          <p:nvPr>
+            <p:ph type="title"/>
+          </p:nvPr>
+        </p:nvSpPr>
+        <p:spPr/>
+        <p:txBody>
+          <a:bodyPr/>
+          <a:lstStyle/>
+          <a:p>
+            <a:r>
+              <a:rPr lang="en-TR" b="1" dirty="0"/>
+              <a:t>Decorator Pattern ile</a:t>
+            </a:r>
+          </a:p>
+        </p:txBody>
+      </p:sp>
+      <p:sp>
+        <p:nvSpPr>
+          <p:cNvPr id="3" name="Content Placeholder 2">
+            <a:extLst>
+              <a:ext uri="{FF2B5EF4-FFF2-40B4-BE49-F238E27FC236}">
+                <a16:creationId xmlns:a16="http://schemas.microsoft.com/office/drawing/2014/main" id="{FB9899F9-DC28-23FA-395F-F668F8865D4D}"/>
+              </a:ext>
+            </a:extLst>
+          </p:cNvPr>
+          <p:cNvSpPr>
+            <a:spLocks noGrp="1"/>
+          </p:cNvSpPr>
+          <p:nvPr>
+            <p:ph idx="1"/>
+          </p:nvPr>
+        </p:nvSpPr>
+        <p:spPr>
+          <a:xfrm>
+            <a:off x="838200" y="1478784"/>
+            <a:ext cx="10515600" cy="1777111"/>
+          </a:xfrm>
+        </p:spPr>
+        <p:txBody>
+          <a:bodyPr>
+            <a:normAutofit fontScale="92500" lnSpcReduction="20000"/>
+          </a:bodyPr>
+          <a:lstStyle/>
+          <a:p>
+            <a:r>
+              <a:rPr lang="en-TR" dirty="0"/>
+              <a:t>Kalıtım yerine Kompozisyon kullanarak, yazılıma esnekliği katmış olursunuz. </a:t>
+            </a:r>
+          </a:p>
+          <a:p>
+            <a:r>
+              <a:rPr lang="en-TR" dirty="0"/>
+              <a:t>Yeni bir özellik eklemek OCP ihlal etmeden, diğer nesneleri etkilemeden nesnelere dinamik bir yapı sağlanmaktadır.</a:t>
+            </a:r>
+          </a:p>
+          <a:p>
+            <a:r>
+              <a:rPr lang="en-TR" dirty="0"/>
+              <a:t>Nesneleri çalışma zamanında sadece değişiklikten etkilenecek şekilde tasarlamış olursunuz.</a:t>
+            </a:r>
+          </a:p>
+          <a:p>
+            <a:pPr marL="0" indent="0">
+              <a:buNone/>
+            </a:pPr>
+            <a:endParaRPr lang="en-TR" dirty="0"/>
+          </a:p>
+          <a:p>
+            <a:pPr marL="0" indent="0">
+              <a:buNone/>
+            </a:pPr>
+            <a:endParaRPr lang="en-TR" dirty="0"/>
+          </a:p>
+          <a:p>
+            <a:pPr marL="0" indent="0">
+              <a:buNone/>
+            </a:pPr>
+            <a:endParaRPr lang="en-TR" dirty="0"/>
+          </a:p>
+          <a:p>
+            <a:pPr marL="0" indent="0">
+              <a:buNone/>
+            </a:pPr>
+            <a:endParaRPr lang="en-TR" dirty="0"/>
+          </a:p>
+          <a:p>
+            <a:pPr marL="0" indent="0">
+              <a:buNone/>
+            </a:pPr>
+            <a:endParaRPr lang="en-TR" dirty="0"/>
+          </a:p>
+          <a:p>
+            <a:endParaRPr lang="en-TR" dirty="0"/>
+          </a:p>
+        </p:txBody>
+      </p:sp>
+      <p:sp>
+        <p:nvSpPr>
+          <p:cNvPr id="4" name="Content Placeholder 2">
+            <a:extLst>
+              <a:ext uri="{FF2B5EF4-FFF2-40B4-BE49-F238E27FC236}">
+                <a16:creationId xmlns:a16="http://schemas.microsoft.com/office/drawing/2014/main" id="{EB620FEE-FBC9-8B82-2EB7-8F49D19B1D68}"/>
+              </a:ext>
+            </a:extLst>
+          </p:cNvPr>
+          <p:cNvSpPr txBox="1">
+            <a:spLocks/>
+          </p:cNvSpPr>
+          <p:nvPr/>
+        </p:nvSpPr>
+        <p:spPr>
+          <a:xfrm>
+            <a:off x="838200" y="3895721"/>
+            <a:ext cx="10515600" cy="1290254"/>
+          </a:xfrm>
+          <a:prstGeom prst="rect">
+            <a:avLst/>
+          </a:prstGeom>
+        </p:spPr>
+        <p:txBody>
+          <a:bodyPr vert="horz" lIns="91440" tIns="45720" rIns="91440" bIns="45720" rtlCol="0">
+            <a:normAutofit fontScale="32500" lnSpcReduction="20000"/>
+          </a:bodyPr>
+          <a:lstStyle>
+            <a:lvl1pPr marL="228600" indent="-228600" algn="l" defTabSz="914400" rtl="0" eaLnBrk="1" latinLnBrk="0" hangingPunct="1">
+              <a:lnSpc>
+                <a:spcPct val="90000"/>
+              </a:lnSpc>
+              <a:spcBef>
+                <a:spcPts val="1000"/>
+              </a:spcBef>
+              <a:buFont typeface="Arial" panose="020B0604020202020204" pitchFamily="34" charset="0"/>
+              <a:buChar char="•"/>
+              <a:defRPr sz="2800" kern="1200">
+                <a:solidFill>
+                  <a:schemeClr val="tx1"/>
+                </a:solidFill>
+                <a:latin typeface="+mn-lt"/>
+                <a:ea typeface="+mn-ea"/>
+                <a:cs typeface="+mn-cs"/>
+              </a:defRPr>
+            </a:lvl1pPr>
+            <a:lvl2pPr marL="685800" indent="-228600" algn="l" defTabSz="914400" rtl="0" eaLnBrk="1" latinLnBrk="0" hangingPunct="1">
+              <a:lnSpc>
+                <a:spcPct val="90000"/>
+              </a:lnSpc>
+              <a:spcBef>
+                <a:spcPts val="500"/>
+              </a:spcBef>
+              <a:buFont typeface="Arial" panose="020B0604020202020204" pitchFamily="34" charset="0"/>
+              <a:buChar char="•"/>
+              <a:defRPr sz="2400" kern="1200">
+                <a:solidFill>
+                  <a:schemeClr val="tx1"/>
+                </a:solidFill>
+                <a:latin typeface="+mn-lt"/>
+                <a:ea typeface="+mn-ea"/>
+                <a:cs typeface="+mn-cs"/>
+              </a:defRPr>
+            </a:lvl2pPr>
+            <a:lvl3pPr marL="1143000" indent="-228600" algn="l" defTabSz="914400" rtl="0" eaLnBrk="1" latinLnBrk="0" hangingPunct="1">
+              <a:lnSpc>
+                <a:spcPct val="90000"/>
+              </a:lnSpc>
+              <a:spcBef>
+                <a:spcPts val="500"/>
+              </a:spcBef>
+              <a:buFont typeface="Arial" panose="020B0604020202020204" pitchFamily="34" charset="0"/>
+              <a:buChar char="•"/>
+              <a:defRPr sz="2000" kern="1200">
+                <a:solidFill>
+                  <a:schemeClr val="tx1"/>
+                </a:solidFill>
+                <a:latin typeface="+mn-lt"/>
+                <a:ea typeface="+mn-ea"/>
+                <a:cs typeface="+mn-cs"/>
+              </a:defRPr>
+            </a:lvl3pPr>
+            <a:lvl4pPr marL="1600200" indent="-228600" algn="l" defTabSz="914400" rtl="0" eaLnBrk="1" latinLnBrk="0" hangingPunct="1">
+              <a:lnSpc>
+                <a:spcPct val="90000"/>
+              </a:lnSpc>
+              <a:spcBef>
+                <a:spcPts val="500"/>
+              </a:spcBef>
+              <a:buFont typeface="Arial" panose="020B0604020202020204" pitchFamily="34" charset="0"/>
+              <a:buChar char="•"/>
+              <a:defRPr sz="1800" kern="1200">
+                <a:solidFill>
+                  <a:schemeClr val="tx1"/>
+                </a:solidFill>
+                <a:latin typeface="+mn-lt"/>
+                <a:ea typeface="+mn-ea"/>
+                <a:cs typeface="+mn-cs"/>
+              </a:defRPr>
+            </a:lvl4pPr>
+            <a:lvl5pPr marL="2057400" indent="-228600" algn="l" defTabSz="914400" rtl="0" eaLnBrk="1" latinLnBrk="0" hangingPunct="1">
+              <a:lnSpc>
+                <a:spcPct val="90000"/>
+              </a:lnSpc>
+              <a:spcBef>
+                <a:spcPts val="500"/>
+              </a:spcBef>
+              <a:buFont typeface="Arial" panose="020B0604020202020204" pitchFamily="34" charset="0"/>
+              <a:buChar char="•"/>
+              <a:defRPr sz="1800" kern="1200">
+                <a:solidFill>
+                  <a:schemeClr val="tx1"/>
+                </a:solidFill>
+                <a:latin typeface="+mn-lt"/>
+                <a:ea typeface="+mn-ea"/>
+                <a:cs typeface="+mn-cs"/>
+              </a:defRPr>
+            </a:lvl5pPr>
+            <a:lvl6pPr marL="2514600" indent="-228600" algn="l" defTabSz="914400" rtl="0" eaLnBrk="1" latinLnBrk="0" hangingPunct="1">
+              <a:lnSpc>
+                <a:spcPct val="90000"/>
+              </a:lnSpc>
+              <a:spcBef>
+                <a:spcPts val="500"/>
+              </a:spcBef>
+              <a:buFont typeface="Arial" panose="020B0604020202020204" pitchFamily="34" charset="0"/>
+              <a:buChar char="•"/>
+              <a:defRPr sz="1800" kern="1200">
+                <a:solidFill>
+                  <a:schemeClr val="tx1"/>
+                </a:solidFill>
+                <a:latin typeface="+mn-lt"/>
+                <a:ea typeface="+mn-ea"/>
+                <a:cs typeface="+mn-cs"/>
+              </a:defRPr>
+            </a:lvl6pPr>
+            <a:lvl7pPr marL="2971800" indent="-228600" algn="l" defTabSz="914400" rtl="0" eaLnBrk="1" latinLnBrk="0" hangingPunct="1">
+              <a:lnSpc>
+                <a:spcPct val="90000"/>
+              </a:lnSpc>
+              <a:spcBef>
+                <a:spcPts val="500"/>
+              </a:spcBef>
+              <a:buFont typeface="Arial" panose="020B0604020202020204" pitchFamily="34" charset="0"/>
+              <a:buChar char="•"/>
+              <a:defRPr sz="1800" kern="1200">
+                <a:solidFill>
+                  <a:schemeClr val="tx1"/>
+                </a:solidFill>
+                <a:latin typeface="+mn-lt"/>
+                <a:ea typeface="+mn-ea"/>
+                <a:cs typeface="+mn-cs"/>
+              </a:defRPr>
+            </a:lvl7pPr>
+            <a:lvl8pPr marL="3429000" indent="-228600" algn="l" defTabSz="914400" rtl="0" eaLnBrk="1" latinLnBrk="0" hangingPunct="1">
+              <a:lnSpc>
+                <a:spcPct val="90000"/>
+              </a:lnSpc>
+              <a:spcBef>
+                <a:spcPts val="500"/>
+              </a:spcBef>
+              <a:buFont typeface="Arial" panose="020B0604020202020204" pitchFamily="34" charset="0"/>
+              <a:buChar char="•"/>
+              <a:defRPr sz="1800" kern="1200">
+                <a:solidFill>
+                  <a:schemeClr val="tx1"/>
+                </a:solidFill>
+                <a:latin typeface="+mn-lt"/>
+                <a:ea typeface="+mn-ea"/>
+                <a:cs typeface="+mn-cs"/>
+              </a:defRPr>
+            </a:lvl8pPr>
+            <a:lvl9pPr marL="3886200" indent="-228600" algn="l" defTabSz="914400" rtl="0" eaLnBrk="1" latinLnBrk="0" hangingPunct="1">
+              <a:lnSpc>
+                <a:spcPct val="90000"/>
+              </a:lnSpc>
+              <a:spcBef>
+                <a:spcPts val="500"/>
+              </a:spcBef>
+              <a:buFont typeface="Arial" panose="020B0604020202020204" pitchFamily="34" charset="0"/>
+              <a:buChar char="•"/>
+              <a:defRPr sz="1800" kern="1200">
+                <a:solidFill>
+                  <a:schemeClr val="tx1"/>
+                </a:solidFill>
+                <a:latin typeface="+mn-lt"/>
+                <a:ea typeface="+mn-ea"/>
+                <a:cs typeface="+mn-cs"/>
+              </a:defRPr>
+            </a:lvl9pPr>
+          </a:lstStyle>
+          <a:p>
+            <a:pPr marL="0" indent="0" algn="l">
+              <a:buNone/>
+            </a:pPr>
+            <a:r>
+              <a:rPr lang="en-US" sz="5100" dirty="0" err="1"/>
+              <a:t>Nerede</a:t>
+            </a:r>
+            <a:r>
+              <a:rPr lang="en-US" sz="5100" dirty="0"/>
+              <a:t> </a:t>
+            </a:r>
+            <a:r>
+              <a:rPr lang="en-US" sz="5100" dirty="0" err="1"/>
+              <a:t>Kullanılıyor</a:t>
+            </a:r>
+            <a:r>
+              <a:rPr lang="en-US" sz="5100" dirty="0"/>
+              <a:t>?</a:t>
+            </a:r>
+          </a:p>
+          <a:p>
+            <a:pPr algn="l">
+              <a:buFont typeface="Arial" panose="020B0604020202020204" pitchFamily="34" charset="0"/>
+              <a:buChar char="•"/>
+            </a:pPr>
+            <a:r>
+              <a:rPr lang="en-US" sz="5100" dirty="0" err="1"/>
+              <a:t>Java.io</a:t>
+            </a:r>
+            <a:r>
+              <a:rPr lang="en-US" sz="5100" dirty="0"/>
+              <a:t> </a:t>
+            </a:r>
+            <a:r>
+              <a:rPr lang="en-US" sz="5100" dirty="0" err="1"/>
+              <a:t>içerisindeki</a:t>
+            </a:r>
+            <a:r>
+              <a:rPr lang="en-US" sz="5100" dirty="0"/>
+              <a:t> </a:t>
+            </a:r>
+            <a:r>
+              <a:rPr lang="en-US" sz="5100" dirty="0" err="1"/>
+              <a:t>InputStream</a:t>
+            </a:r>
+            <a:r>
+              <a:rPr lang="en-US" sz="5100" dirty="0"/>
+              <a:t> </a:t>
+            </a:r>
+            <a:r>
+              <a:rPr lang="en-US" sz="5100" dirty="0" err="1"/>
+              <a:t>sınıfı</a:t>
+            </a:r>
+            <a:endParaRPr lang="en-US" sz="5100" dirty="0"/>
+          </a:p>
+          <a:p>
+            <a:pPr algn="l">
+              <a:buFont typeface="Arial" panose="020B0604020202020204" pitchFamily="34" charset="0"/>
+              <a:buChar char="•"/>
+            </a:pPr>
+            <a:r>
+              <a:rPr lang="en-US" sz="5100" b="1" dirty="0">
+                <a:hlinkClick r:id="rId2">
+                  <a:extLst>
+                    <a:ext uri="{A12FA001-AC4F-418D-AE19-62706E023703}">
+                      <ahyp:hlinkClr xmlns:ahyp="http://schemas.microsoft.com/office/drawing/2018/hyperlinkcolor" val="tx"/>
+                    </a:ext>
+                  </a:extLst>
+                </a:hlinkClick>
+              </a:rPr>
+              <a:t>java.util.Collections</a:t>
+            </a:r>
+            <a:r>
+              <a:rPr lang="en-US" sz="5100" b="1" dirty="0"/>
+              <a:t>, ‘</a:t>
+            </a:r>
+            <a:r>
+              <a:rPr lang="en-US" sz="5100" b="1" dirty="0" err="1"/>
+              <a:t>daki</a:t>
+            </a:r>
+            <a:r>
+              <a:rPr lang="en-US" sz="5100" b="1" dirty="0"/>
+              <a:t> -&gt; </a:t>
+            </a:r>
+            <a:r>
+              <a:rPr lang="en-US" sz="5100" dirty="0"/>
+              <a:t> </a:t>
+            </a:r>
+            <a:r>
+              <a:rPr lang="en-US" sz="5100" b="1" dirty="0">
+                <a:hlinkClick r:id="rId3">
+                  <a:extLst>
+                    <a:ext uri="{A12FA001-AC4F-418D-AE19-62706E023703}">
+                      <ahyp:hlinkClr xmlns:ahyp="http://schemas.microsoft.com/office/drawing/2018/hyperlinkcolor" val="tx"/>
+                    </a:ext>
+                  </a:extLst>
+                </a:hlinkClick>
+              </a:rPr>
+              <a:t>checkedXXX</a:t>
+            </a:r>
+            <a:r>
+              <a:rPr lang="en-US" sz="5100" dirty="0">
+                <a:hlinkClick r:id="rId3">
+                  <a:extLst>
+                    <a:ext uri="{A12FA001-AC4F-418D-AE19-62706E023703}">
+                      <ahyp:hlinkClr xmlns:ahyp="http://schemas.microsoft.com/office/drawing/2018/hyperlinkcolor" val="tx"/>
+                    </a:ext>
+                  </a:extLst>
+                </a:hlinkClick>
+              </a:rPr>
+              <a:t>()</a:t>
+            </a:r>
+            <a:r>
+              <a:rPr lang="en-US" sz="5100" dirty="0"/>
+              <a:t>, </a:t>
+            </a:r>
+            <a:r>
+              <a:rPr lang="en-US" sz="5100" b="1" dirty="0">
+                <a:hlinkClick r:id="rId4">
+                  <a:extLst>
+                    <a:ext uri="{A12FA001-AC4F-418D-AE19-62706E023703}">
+                      <ahyp:hlinkClr xmlns:ahyp="http://schemas.microsoft.com/office/drawing/2018/hyperlinkcolor" val="tx"/>
+                    </a:ext>
+                  </a:extLst>
+                </a:hlinkClick>
+              </a:rPr>
+              <a:t>synchronizedXXX</a:t>
+            </a:r>
+            <a:r>
+              <a:rPr lang="en-US" sz="5100" dirty="0">
+                <a:hlinkClick r:id="rId4">
+                  <a:extLst>
+                    <a:ext uri="{A12FA001-AC4F-418D-AE19-62706E023703}">
+                      <ahyp:hlinkClr xmlns:ahyp="http://schemas.microsoft.com/office/drawing/2018/hyperlinkcolor" val="tx"/>
+                    </a:ext>
+                  </a:extLst>
+                </a:hlinkClick>
+              </a:rPr>
+              <a:t>()</a:t>
+            </a:r>
+            <a:r>
+              <a:rPr lang="en-US" sz="5100" dirty="0"/>
+              <a:t> and </a:t>
+            </a:r>
+            <a:r>
+              <a:rPr lang="en-US" sz="5100" b="1" dirty="0">
+                <a:hlinkClick r:id="rId5">
+                  <a:extLst>
+                    <a:ext uri="{A12FA001-AC4F-418D-AE19-62706E023703}">
+                      <ahyp:hlinkClr xmlns:ahyp="http://schemas.microsoft.com/office/drawing/2018/hyperlinkcolor" val="tx"/>
+                    </a:ext>
+                  </a:extLst>
+                </a:hlinkClick>
+              </a:rPr>
+              <a:t>unmodifiableXXX</a:t>
+            </a:r>
+            <a:r>
+              <a:rPr lang="en-US" sz="5100" dirty="0">
+                <a:hlinkClick r:id="rId5">
+                  <a:extLst>
+                    <a:ext uri="{A12FA001-AC4F-418D-AE19-62706E023703}">
+                      <ahyp:hlinkClr xmlns:ahyp="http://schemas.microsoft.com/office/drawing/2018/hyperlinkcolor" val="tx"/>
+                    </a:ext>
+                  </a:extLst>
+                </a:hlinkClick>
+              </a:rPr>
+              <a:t>()</a:t>
+            </a:r>
+            <a:r>
+              <a:rPr lang="en-US" sz="5100" dirty="0"/>
+              <a:t>.</a:t>
+            </a:r>
+          </a:p>
+          <a:p>
+            <a:pPr algn="l">
+              <a:buFont typeface="Arial" panose="020B0604020202020204" pitchFamily="34" charset="0"/>
+              <a:buChar char="•"/>
+            </a:pPr>
+            <a:r>
+              <a:rPr lang="en-US" sz="5100" b="1" dirty="0">
+                <a:hlinkClick r:id="rId6">
+                  <a:extLst>
+                    <a:ext uri="{A12FA001-AC4F-418D-AE19-62706E023703}">
+                      <ahyp:hlinkClr xmlns:ahyp="http://schemas.microsoft.com/office/drawing/2018/hyperlinkcolor" val="tx"/>
+                    </a:ext>
+                  </a:extLst>
+                </a:hlinkClick>
+              </a:rPr>
+              <a:t>javax.servlet.http.HttpServletRequestWrapper</a:t>
+            </a:r>
+            <a:r>
+              <a:rPr lang="en-US" sz="5100" b="1" dirty="0"/>
+              <a:t> </a:t>
+            </a:r>
+            <a:r>
+              <a:rPr lang="en-US" sz="5100" dirty="0"/>
+              <a:t>and </a:t>
+            </a:r>
+            <a:r>
+              <a:rPr lang="en-US" sz="5100" b="1" dirty="0">
+                <a:hlinkClick r:id="rId7">
+                  <a:extLst>
+                    <a:ext uri="{A12FA001-AC4F-418D-AE19-62706E023703}">
+                      <ahyp:hlinkClr xmlns:ahyp="http://schemas.microsoft.com/office/drawing/2018/hyperlinkcolor" val="tx"/>
+                    </a:ext>
+                  </a:extLst>
+                </a:hlinkClick>
+              </a:rPr>
+              <a:t>HttpServletResponseWrapper</a:t>
+            </a:r>
+            <a:endParaRPr lang="en-US" sz="5100" b="1" dirty="0"/>
+          </a:p>
+          <a:p>
+            <a:endParaRPr lang="en-TR" dirty="0"/>
+          </a:p>
+        </p:txBody>
+      </p:sp>
+      <p:pic>
+        <p:nvPicPr>
+          <p:cNvPr id="6" name="Picture 5">
+            <a:extLst>
+              <a:ext uri="{FF2B5EF4-FFF2-40B4-BE49-F238E27FC236}">
+                <a16:creationId xmlns:a16="http://schemas.microsoft.com/office/drawing/2014/main" id="{DD97525C-2E70-78EC-9BE4-D660AD364708}"/>
+              </a:ext>
+            </a:extLst>
+          </p:cNvPr>
+          <p:cNvPicPr>
+            <a:picLocks noChangeAspect="1"/>
+          </p:cNvPicPr>
+          <p:nvPr/>
+        </p:nvPicPr>
+        <p:blipFill>
+          <a:blip r:embed="rId8"/>
+          <a:stretch>
+            <a:fillRect/>
+          </a:stretch>
+        </p:blipFill>
+        <p:spPr>
+          <a:xfrm>
+            <a:off x="4000500" y="5185975"/>
+            <a:ext cx="4191000" cy="1625600"/>
+          </a:xfrm>
+          <a:prstGeom prst="rect">
+            <a:avLst/>
+          </a:prstGeom>
+        </p:spPr>
+      </p:pic>
+    </p:spTree>
+    <p:extLst>
+      <p:ext uri="{BB962C8B-B14F-4D97-AF65-F5344CB8AC3E}">
+        <p14:creationId xmlns:p14="http://schemas.microsoft.com/office/powerpoint/2010/main" val="1014722584"/>
+      </p:ext>
+    </p:extLst>
+  </p:cSld>
+  <p:clrMapOvr>
+    <a:masterClrMapping/>
+  </p:clrMapOvr>
+</p:sld>
+</file>
+
+<file path=ppt/slides/slide26.xml><?xml version="1.0" encoding="utf-8"?>
+<p:sld xmlns:a="http://schemas.openxmlformats.org/drawingml/2006/main" xmlns:r="http://schemas.openxmlformats.org/officeDocument/2006/relationships" xmlns:p="http://schemas.openxmlformats.org/presentationml/2006/main">
+  <p:cSld>
+    <p:spTree>
+      <p:nvGrpSpPr>
         <p:cNvPr id="1" name=""/>
         <p:cNvGrpSpPr/>
         <p:nvPr/>
@@ -7280,7 +9122,7 @@
         <p:cNvPr id="1" name="">
           <a:extLst>
             <a:ext uri="{FF2B5EF4-FFF2-40B4-BE49-F238E27FC236}">
-              <a16:creationId xmlns:a16="http://schemas.microsoft.com/office/drawing/2014/main" id="{5447D95E-7C78-D254-5333-E2DFFE65EFBA}"/>
+              <a16:creationId xmlns:a16="http://schemas.microsoft.com/office/drawing/2014/main" id="{8CDF887E-C996-20BE-0F88-B12E0940B32C}"/>
             </a:ext>
           </a:extLst>
         </p:cNvPr>
@@ -7300,43 +9142,61 @@
           <p:cNvPr id="2" name="Title 1">
             <a:extLst>
               <a:ext uri="{FF2B5EF4-FFF2-40B4-BE49-F238E27FC236}">
-                <a16:creationId xmlns:a16="http://schemas.microsoft.com/office/drawing/2014/main" id="{CCCABEDC-D51E-2064-590C-2D05785471F1}"/>
-              </a:ext>
-            </a:extLst>
-          </p:cNvPr>
-          <p:cNvSpPr>
-            <a:spLocks noGrp="1"/>
-          </p:cNvSpPr>
-          <p:nvPr>
-            <p:ph type="title"/>
-          </p:nvPr>
-        </p:nvSpPr>
-        <p:spPr/>
-        <p:txBody>
-          <a:bodyPr/>
+                <a16:creationId xmlns:a16="http://schemas.microsoft.com/office/drawing/2014/main" id="{2EA10908-0949-3712-36E0-DCE73674DA60}"/>
+              </a:ext>
+            </a:extLst>
+          </p:cNvPr>
+          <p:cNvSpPr>
+            <a:spLocks noGrp="1"/>
+          </p:cNvSpPr>
+          <p:nvPr>
+            <p:ph type="ctrTitle"/>
+          </p:nvPr>
+        </p:nvSpPr>
+        <p:spPr>
+          <a:xfrm>
+            <a:off x="1524000" y="1122363"/>
+            <a:ext cx="9144000" cy="2133599"/>
+          </a:xfrm>
+        </p:spPr>
+        <p:txBody>
+          <a:bodyPr>
+            <a:normAutofit fontScale="90000"/>
+          </a:bodyPr>
           <a:lstStyle/>
           <a:p>
             <a:r>
               <a:rPr lang="en-TR" b="1" dirty="0"/>
-              <a:t>Behoviral - Davranışsal</a:t>
-            </a:r>
-          </a:p>
-        </p:txBody>
-      </p:sp>
-      <p:sp>
-        <p:nvSpPr>
-          <p:cNvPr id="3" name="Content Placeholder 2">
-            <a:extLst>
-              <a:ext uri="{FF2B5EF4-FFF2-40B4-BE49-F238E27FC236}">
-                <a16:creationId xmlns:a16="http://schemas.microsoft.com/office/drawing/2014/main" id="{46F91C17-C9F8-50A4-86E5-ABB2BB5B08A9}"/>
-              </a:ext>
-            </a:extLst>
-          </p:cNvPr>
-          <p:cNvSpPr>
-            <a:spLocks noGrp="1"/>
-          </p:cNvSpPr>
-          <p:nvPr>
-            <p:ph idx="1"/>
+              <a:t>Design Pattern Series</a:t>
+            </a:r>
+            <a:br>
+              <a:rPr lang="en-TR" b="1" dirty="0"/>
+            </a:br>
+            <a:r>
+              <a:rPr lang="en-TR" sz="4200" b="1" dirty="0"/>
+              <a:t>Strategy Pattern</a:t>
+            </a:r>
+            <a:br>
+              <a:rPr lang="en-TR" b="1" dirty="0"/>
+            </a:br>
+            <a:endParaRPr lang="en-TR" b="1" dirty="0"/>
+          </a:p>
+        </p:txBody>
+      </p:sp>
+      <p:sp>
+        <p:nvSpPr>
+          <p:cNvPr id="3" name="Subtitle 2">
+            <a:extLst>
+              <a:ext uri="{FF2B5EF4-FFF2-40B4-BE49-F238E27FC236}">
+                <a16:creationId xmlns:a16="http://schemas.microsoft.com/office/drawing/2014/main" id="{F4352D19-79AA-171B-3EF7-7692DF695ADD}"/>
+              </a:ext>
+            </a:extLst>
+          </p:cNvPr>
+          <p:cNvSpPr>
+            <a:spLocks noGrp="1"/>
+          </p:cNvSpPr>
+          <p:nvPr>
+            <p:ph type="subTitle" idx="1"/>
           </p:nvPr>
         </p:nvSpPr>
         <p:spPr/>
@@ -7348,63 +9208,66 @@
           <a:p>
             <a:r>
               <a:rPr lang="en-TR" b="1" dirty="0"/>
-              <a:t>Strategy</a:t>
-            </a:r>
-          </a:p>
-          <a:p>
-            <a:r>
-              <a:rPr lang="en-TR" dirty="0"/>
-              <a:t>Command</a:t>
-            </a:r>
-          </a:p>
-          <a:p>
-            <a:r>
-              <a:rPr lang="en-TR" dirty="0"/>
-              <a:t>Template Method</a:t>
-            </a:r>
-          </a:p>
-          <a:p>
-            <a:r>
-              <a:rPr lang="en-TR" dirty="0"/>
-              <a:t>Observer</a:t>
-            </a:r>
-          </a:p>
-          <a:p>
-            <a:r>
-              <a:rPr lang="en-TR" dirty="0"/>
-              <a:t>Memento</a:t>
-            </a:r>
-          </a:p>
-          <a:p>
-            <a:r>
-              <a:rPr lang="en-TR" dirty="0"/>
-              <a:t>Mediator</a:t>
-            </a:r>
-          </a:p>
-          <a:p>
-            <a:r>
-              <a:rPr lang="en-TR" dirty="0"/>
-              <a:t>Chain Of Responsibility</a:t>
-            </a:r>
-          </a:p>
-          <a:p>
-            <a:r>
-              <a:rPr lang="en-TR" dirty="0"/>
-              <a:t>Visitor</a:t>
-            </a:r>
-          </a:p>
-          <a:p>
-            <a:r>
-              <a:rPr lang="en-TR" dirty="0"/>
-              <a:t>State</a:t>
-            </a:r>
-          </a:p>
-        </p:txBody>
-      </p:sp>
+              <a:t>Behoviral (Davranışsal)</a:t>
+            </a:r>
+          </a:p>
+          <a:p>
+            <a:endParaRPr lang="en-TR" dirty="0"/>
+          </a:p>
+          <a:p>
+            <a:endParaRPr lang="en-TR" b="1" dirty="0"/>
+          </a:p>
+          <a:p>
+            <a:r>
+              <a:rPr lang="en-TR" b="1" dirty="0"/>
+              <a:t>Someone has already solved your problems.</a:t>
+            </a:r>
+          </a:p>
+          <a:p>
+            <a:endParaRPr lang="en-TR" dirty="0"/>
+          </a:p>
+        </p:txBody>
+      </p:sp>
+      <p:cxnSp>
+        <p:nvCxnSpPr>
+          <p:cNvPr id="5" name="Straight Connector 4">
+            <a:extLst>
+              <a:ext uri="{FF2B5EF4-FFF2-40B4-BE49-F238E27FC236}">
+                <a16:creationId xmlns:a16="http://schemas.microsoft.com/office/drawing/2014/main" id="{03CC6E5E-7008-E81A-27DA-64F1ADE0B4BA}"/>
+              </a:ext>
+            </a:extLst>
+          </p:cNvPr>
+          <p:cNvCxnSpPr/>
+          <p:nvPr/>
+        </p:nvCxnSpPr>
+        <p:spPr>
+          <a:xfrm>
+            <a:off x="1701800" y="4419600"/>
+            <a:ext cx="8695267" cy="0"/>
+          </a:xfrm>
+          <a:prstGeom prst="line">
+            <a:avLst/>
+          </a:prstGeom>
+        </p:spPr>
+        <p:style>
+          <a:lnRef idx="1">
+            <a:schemeClr val="accent1"/>
+          </a:lnRef>
+          <a:fillRef idx="0">
+            <a:schemeClr val="accent1"/>
+          </a:fillRef>
+          <a:effectRef idx="0">
+            <a:schemeClr val="accent1"/>
+          </a:effectRef>
+          <a:fontRef idx="minor">
+            <a:schemeClr val="tx1"/>
+          </a:fontRef>
+        </p:style>
+      </p:cxnSp>
     </p:spTree>
     <p:extLst>
       <p:ext uri="{BB962C8B-B14F-4D97-AF65-F5344CB8AC3E}">
-        <p14:creationId xmlns:p14="http://schemas.microsoft.com/office/powerpoint/2010/main" val="160121368"/>
+        <p14:creationId xmlns:p14="http://schemas.microsoft.com/office/powerpoint/2010/main" val="1825336620"/>
       </p:ext>
     </p:extLst>
   </p:cSld>

</xml_diff>